<commit_message>
Small update to powerpoint
</commit_message>
<xml_diff>
--- a/Presentation Powerpoint.pptx
+++ b/Presentation Powerpoint.pptx
@@ -120,6 +120,11 @@
       </a:defRPr>
     </a:lvl9pPr>
   </p:defaultTextStyle>
+  <p:extLst>
+    <p:ext uri="{EFAFB233-063F-42B5-8137-9DF3F51BA10A}">
+      <p15:sldGuideLst xmlns:p15="http://schemas.microsoft.com/office/powerpoint/2012/main"/>
+    </p:ext>
+  </p:extLst>
 </p:presentation>
 </file>
 
@@ -873,6 +878,753 @@
 </file>
 
 <file path=ppt/diagrams/colors2.xml><?xml version="1.0" encoding="utf-8"?>
+<dgm:colorsDef xmlns:dgm="http://schemas.openxmlformats.org/drawingml/2006/diagram" xmlns:a="http://schemas.openxmlformats.org/drawingml/2006/main" uniqueId="urn:microsoft.com/office/officeart/2005/8/colors/accent1_2">
+  <dgm:title val=""/>
+  <dgm:desc val=""/>
+  <dgm:catLst>
+    <dgm:cat type="accent1" pri="11200"/>
+  </dgm:catLst>
+  <dgm:styleLbl name="node0">
+    <dgm:fillClrLst meth="repeat">
+      <a:schemeClr val="accent1"/>
+    </dgm:fillClrLst>
+    <dgm:linClrLst meth="repeat">
+      <a:schemeClr val="lt1"/>
+    </dgm:linClrLst>
+    <dgm:effectClrLst/>
+    <dgm:txLinClrLst/>
+    <dgm:txFillClrLst/>
+    <dgm:txEffectClrLst/>
+  </dgm:styleLbl>
+  <dgm:styleLbl name="alignNode1">
+    <dgm:fillClrLst meth="repeat">
+      <a:schemeClr val="accent1"/>
+    </dgm:fillClrLst>
+    <dgm:linClrLst meth="repeat">
+      <a:schemeClr val="accent1"/>
+    </dgm:linClrLst>
+    <dgm:effectClrLst/>
+    <dgm:txLinClrLst/>
+    <dgm:txFillClrLst/>
+    <dgm:txEffectClrLst/>
+  </dgm:styleLbl>
+  <dgm:styleLbl name="node1">
+    <dgm:fillClrLst meth="repeat">
+      <a:schemeClr val="accent1"/>
+    </dgm:fillClrLst>
+    <dgm:linClrLst meth="repeat">
+      <a:schemeClr val="lt1"/>
+    </dgm:linClrLst>
+    <dgm:effectClrLst/>
+    <dgm:txLinClrLst/>
+    <dgm:txFillClrLst/>
+    <dgm:txEffectClrLst/>
+  </dgm:styleLbl>
+  <dgm:styleLbl name="lnNode1">
+    <dgm:fillClrLst meth="repeat">
+      <a:schemeClr val="accent1"/>
+    </dgm:fillClrLst>
+    <dgm:linClrLst meth="repeat">
+      <a:schemeClr val="lt1"/>
+    </dgm:linClrLst>
+    <dgm:effectClrLst/>
+    <dgm:txLinClrLst/>
+    <dgm:txFillClrLst/>
+    <dgm:txEffectClrLst/>
+  </dgm:styleLbl>
+  <dgm:styleLbl name="vennNode1">
+    <dgm:fillClrLst meth="repeat">
+      <a:schemeClr val="accent1">
+        <a:alpha val="50000"/>
+      </a:schemeClr>
+    </dgm:fillClrLst>
+    <dgm:linClrLst meth="repeat">
+      <a:schemeClr val="lt1"/>
+    </dgm:linClrLst>
+    <dgm:effectClrLst/>
+    <dgm:txLinClrLst/>
+    <dgm:txFillClrLst/>
+    <dgm:txEffectClrLst/>
+  </dgm:styleLbl>
+  <dgm:styleLbl name="node2">
+    <dgm:fillClrLst meth="repeat">
+      <a:schemeClr val="accent1"/>
+    </dgm:fillClrLst>
+    <dgm:linClrLst meth="repeat">
+      <a:schemeClr val="lt1"/>
+    </dgm:linClrLst>
+    <dgm:effectClrLst/>
+    <dgm:txLinClrLst/>
+    <dgm:txFillClrLst/>
+    <dgm:txEffectClrLst/>
+  </dgm:styleLbl>
+  <dgm:styleLbl name="node3">
+    <dgm:fillClrLst meth="repeat">
+      <a:schemeClr val="accent1"/>
+    </dgm:fillClrLst>
+    <dgm:linClrLst meth="repeat">
+      <a:schemeClr val="lt1"/>
+    </dgm:linClrLst>
+    <dgm:effectClrLst/>
+    <dgm:txLinClrLst/>
+    <dgm:txFillClrLst/>
+    <dgm:txEffectClrLst/>
+  </dgm:styleLbl>
+  <dgm:styleLbl name="node4">
+    <dgm:fillClrLst meth="repeat">
+      <a:schemeClr val="accent1"/>
+    </dgm:fillClrLst>
+    <dgm:linClrLst meth="repeat">
+      <a:schemeClr val="lt1"/>
+    </dgm:linClrLst>
+    <dgm:effectClrLst/>
+    <dgm:txLinClrLst/>
+    <dgm:txFillClrLst/>
+    <dgm:txEffectClrLst/>
+  </dgm:styleLbl>
+  <dgm:styleLbl name="fgImgPlace1">
+    <dgm:fillClrLst meth="repeat">
+      <a:schemeClr val="accent1">
+        <a:tint val="50000"/>
+      </a:schemeClr>
+    </dgm:fillClrLst>
+    <dgm:linClrLst meth="repeat">
+      <a:schemeClr val="lt1"/>
+    </dgm:linClrLst>
+    <dgm:effectClrLst/>
+    <dgm:txLinClrLst/>
+    <dgm:txFillClrLst meth="repeat">
+      <a:schemeClr val="lt1"/>
+    </dgm:txFillClrLst>
+    <dgm:txEffectClrLst/>
+  </dgm:styleLbl>
+  <dgm:styleLbl name="alignImgPlace1">
+    <dgm:fillClrLst meth="repeat">
+      <a:schemeClr val="accent1">
+        <a:tint val="50000"/>
+      </a:schemeClr>
+    </dgm:fillClrLst>
+    <dgm:linClrLst meth="repeat">
+      <a:schemeClr val="lt1"/>
+    </dgm:linClrLst>
+    <dgm:effectClrLst/>
+    <dgm:txLinClrLst/>
+    <dgm:txFillClrLst meth="repeat">
+      <a:schemeClr val="lt1"/>
+    </dgm:txFillClrLst>
+    <dgm:txEffectClrLst/>
+  </dgm:styleLbl>
+  <dgm:styleLbl name="bgImgPlace1">
+    <dgm:fillClrLst meth="repeat">
+      <a:schemeClr val="accent1">
+        <a:tint val="50000"/>
+      </a:schemeClr>
+    </dgm:fillClrLst>
+    <dgm:linClrLst meth="repeat">
+      <a:schemeClr val="lt1"/>
+    </dgm:linClrLst>
+    <dgm:effectClrLst/>
+    <dgm:txLinClrLst/>
+    <dgm:txFillClrLst meth="repeat">
+      <a:schemeClr val="lt1"/>
+    </dgm:txFillClrLst>
+    <dgm:txEffectClrLst/>
+  </dgm:styleLbl>
+  <dgm:styleLbl name="sibTrans2D1">
+    <dgm:fillClrLst meth="repeat">
+      <a:schemeClr val="accent1">
+        <a:tint val="60000"/>
+      </a:schemeClr>
+    </dgm:fillClrLst>
+    <dgm:linClrLst meth="repeat">
+      <a:schemeClr val="accent1">
+        <a:tint val="60000"/>
+      </a:schemeClr>
+    </dgm:linClrLst>
+    <dgm:effectClrLst/>
+    <dgm:txLinClrLst/>
+    <dgm:txFillClrLst/>
+    <dgm:txEffectClrLst/>
+  </dgm:styleLbl>
+  <dgm:styleLbl name="fgSibTrans2D1">
+    <dgm:fillClrLst meth="repeat">
+      <a:schemeClr val="accent1">
+        <a:tint val="60000"/>
+      </a:schemeClr>
+    </dgm:fillClrLst>
+    <dgm:linClrLst meth="repeat">
+      <a:schemeClr val="accent1">
+        <a:tint val="60000"/>
+      </a:schemeClr>
+    </dgm:linClrLst>
+    <dgm:effectClrLst/>
+    <dgm:txLinClrLst/>
+    <dgm:txFillClrLst/>
+    <dgm:txEffectClrLst/>
+  </dgm:styleLbl>
+  <dgm:styleLbl name="bgSibTrans2D1">
+    <dgm:fillClrLst meth="repeat">
+      <a:schemeClr val="accent1">
+        <a:tint val="60000"/>
+      </a:schemeClr>
+    </dgm:fillClrLst>
+    <dgm:linClrLst meth="repeat">
+      <a:schemeClr val="accent1">
+        <a:tint val="60000"/>
+      </a:schemeClr>
+    </dgm:linClrLst>
+    <dgm:effectClrLst/>
+    <dgm:txLinClrLst/>
+    <dgm:txFillClrLst/>
+    <dgm:txEffectClrLst/>
+  </dgm:styleLbl>
+  <dgm:styleLbl name="sibTrans1D1">
+    <dgm:fillClrLst meth="repeat">
+      <a:schemeClr val="accent1"/>
+    </dgm:fillClrLst>
+    <dgm:linClrLst meth="repeat">
+      <a:schemeClr val="accent1"/>
+    </dgm:linClrLst>
+    <dgm:effectClrLst/>
+    <dgm:txLinClrLst/>
+    <dgm:txFillClrLst meth="repeat">
+      <a:schemeClr val="tx1"/>
+    </dgm:txFillClrLst>
+    <dgm:txEffectClrLst/>
+  </dgm:styleLbl>
+  <dgm:styleLbl name="callout">
+    <dgm:fillClrLst meth="repeat">
+      <a:schemeClr val="accent1"/>
+    </dgm:fillClrLst>
+    <dgm:linClrLst meth="repeat">
+      <a:schemeClr val="accent1">
+        <a:tint val="50000"/>
+      </a:schemeClr>
+    </dgm:linClrLst>
+    <dgm:effectClrLst/>
+    <dgm:txLinClrLst/>
+    <dgm:txFillClrLst meth="repeat">
+      <a:schemeClr val="tx1"/>
+    </dgm:txFillClrLst>
+    <dgm:txEffectClrLst/>
+  </dgm:styleLbl>
+  <dgm:styleLbl name="asst0">
+    <dgm:fillClrLst meth="repeat">
+      <a:schemeClr val="accent1"/>
+    </dgm:fillClrLst>
+    <dgm:linClrLst meth="repeat">
+      <a:schemeClr val="lt1"/>
+    </dgm:linClrLst>
+    <dgm:effectClrLst/>
+    <dgm:txLinClrLst/>
+    <dgm:txFillClrLst/>
+    <dgm:txEffectClrLst/>
+  </dgm:styleLbl>
+  <dgm:styleLbl name="asst1">
+    <dgm:fillClrLst meth="repeat">
+      <a:schemeClr val="accent1"/>
+    </dgm:fillClrLst>
+    <dgm:linClrLst meth="repeat">
+      <a:schemeClr val="lt1"/>
+    </dgm:linClrLst>
+    <dgm:effectClrLst/>
+    <dgm:txLinClrLst/>
+    <dgm:txFillClrLst/>
+    <dgm:txEffectClrLst/>
+  </dgm:styleLbl>
+  <dgm:styleLbl name="asst2">
+    <dgm:fillClrLst meth="repeat">
+      <a:schemeClr val="accent1"/>
+    </dgm:fillClrLst>
+    <dgm:linClrLst meth="repeat">
+      <a:schemeClr val="lt1"/>
+    </dgm:linClrLst>
+    <dgm:effectClrLst/>
+    <dgm:txLinClrLst/>
+    <dgm:txFillClrLst/>
+    <dgm:txEffectClrLst/>
+  </dgm:styleLbl>
+  <dgm:styleLbl name="asst3">
+    <dgm:fillClrLst meth="repeat">
+      <a:schemeClr val="accent1"/>
+    </dgm:fillClrLst>
+    <dgm:linClrLst meth="repeat">
+      <a:schemeClr val="lt1"/>
+    </dgm:linClrLst>
+    <dgm:effectClrLst/>
+    <dgm:txLinClrLst/>
+    <dgm:txFillClrLst/>
+    <dgm:txEffectClrLst/>
+  </dgm:styleLbl>
+  <dgm:styleLbl name="asst4">
+    <dgm:fillClrLst meth="repeat">
+      <a:schemeClr val="accent1"/>
+    </dgm:fillClrLst>
+    <dgm:linClrLst meth="repeat">
+      <a:schemeClr val="lt1"/>
+    </dgm:linClrLst>
+    <dgm:effectClrLst/>
+    <dgm:txLinClrLst/>
+    <dgm:txFillClrLst/>
+    <dgm:txEffectClrLst/>
+  </dgm:styleLbl>
+  <dgm:styleLbl name="parChTrans2D1">
+    <dgm:fillClrLst meth="repeat">
+      <a:schemeClr val="accent1">
+        <a:tint val="60000"/>
+      </a:schemeClr>
+    </dgm:fillClrLst>
+    <dgm:linClrLst meth="repeat">
+      <a:schemeClr val="accent1">
+        <a:tint val="60000"/>
+      </a:schemeClr>
+    </dgm:linClrLst>
+    <dgm:effectClrLst/>
+    <dgm:txLinClrLst/>
+    <dgm:txFillClrLst meth="repeat">
+      <a:schemeClr val="lt1"/>
+    </dgm:txFillClrLst>
+    <dgm:txEffectClrLst/>
+  </dgm:styleLbl>
+  <dgm:styleLbl name="parChTrans2D2">
+    <dgm:fillClrLst meth="repeat">
+      <a:schemeClr val="accent1"/>
+    </dgm:fillClrLst>
+    <dgm:linClrLst meth="repeat">
+      <a:schemeClr val="accent1"/>
+    </dgm:linClrLst>
+    <dgm:effectClrLst/>
+    <dgm:txLinClrLst/>
+    <dgm:txFillClrLst meth="repeat">
+      <a:schemeClr val="lt1"/>
+    </dgm:txFillClrLst>
+    <dgm:txEffectClrLst/>
+  </dgm:styleLbl>
+  <dgm:styleLbl name="parChTrans2D3">
+    <dgm:fillClrLst meth="repeat">
+      <a:schemeClr val="accent1"/>
+    </dgm:fillClrLst>
+    <dgm:linClrLst meth="repeat">
+      <a:schemeClr val="accent1"/>
+    </dgm:linClrLst>
+    <dgm:effectClrLst/>
+    <dgm:txLinClrLst/>
+    <dgm:txFillClrLst meth="repeat">
+      <a:schemeClr val="lt1"/>
+    </dgm:txFillClrLst>
+    <dgm:txEffectClrLst/>
+  </dgm:styleLbl>
+  <dgm:styleLbl name="parChTrans2D4">
+    <dgm:fillClrLst meth="repeat">
+      <a:schemeClr val="accent1"/>
+    </dgm:fillClrLst>
+    <dgm:linClrLst meth="repeat">
+      <a:schemeClr val="accent1"/>
+    </dgm:linClrLst>
+    <dgm:effectClrLst/>
+    <dgm:txLinClrLst/>
+    <dgm:txFillClrLst meth="repeat">
+      <a:schemeClr val="lt1"/>
+    </dgm:txFillClrLst>
+    <dgm:txEffectClrLst/>
+  </dgm:styleLbl>
+  <dgm:styleLbl name="parChTrans1D1">
+    <dgm:fillClrLst meth="repeat">
+      <a:schemeClr val="accent1"/>
+    </dgm:fillClrLst>
+    <dgm:linClrLst meth="repeat">
+      <a:schemeClr val="accent1">
+        <a:shade val="60000"/>
+      </a:schemeClr>
+    </dgm:linClrLst>
+    <dgm:effectClrLst/>
+    <dgm:txLinClrLst/>
+    <dgm:txFillClrLst meth="repeat">
+      <a:schemeClr val="tx1"/>
+    </dgm:txFillClrLst>
+    <dgm:txEffectClrLst/>
+  </dgm:styleLbl>
+  <dgm:styleLbl name="parChTrans1D2">
+    <dgm:fillClrLst meth="repeat">
+      <a:schemeClr val="accent1"/>
+    </dgm:fillClrLst>
+    <dgm:linClrLst meth="repeat">
+      <a:schemeClr val="accent1">
+        <a:shade val="60000"/>
+      </a:schemeClr>
+    </dgm:linClrLst>
+    <dgm:effectClrLst/>
+    <dgm:txLinClrLst/>
+    <dgm:txFillClrLst meth="repeat">
+      <a:schemeClr val="tx1"/>
+    </dgm:txFillClrLst>
+    <dgm:txEffectClrLst/>
+  </dgm:styleLbl>
+  <dgm:styleLbl name="parChTrans1D3">
+    <dgm:fillClrLst meth="repeat">
+      <a:schemeClr val="accent1"/>
+    </dgm:fillClrLst>
+    <dgm:linClrLst meth="repeat">
+      <a:schemeClr val="accent1">
+        <a:shade val="80000"/>
+      </a:schemeClr>
+    </dgm:linClrLst>
+    <dgm:effectClrLst/>
+    <dgm:txLinClrLst/>
+    <dgm:txFillClrLst meth="repeat">
+      <a:schemeClr val="tx1"/>
+    </dgm:txFillClrLst>
+    <dgm:txEffectClrLst/>
+  </dgm:styleLbl>
+  <dgm:styleLbl name="parChTrans1D4">
+    <dgm:fillClrLst meth="repeat">
+      <a:schemeClr val="accent1"/>
+    </dgm:fillClrLst>
+    <dgm:linClrLst meth="repeat">
+      <a:schemeClr val="accent1">
+        <a:shade val="80000"/>
+      </a:schemeClr>
+    </dgm:linClrLst>
+    <dgm:effectClrLst/>
+    <dgm:txLinClrLst/>
+    <dgm:txFillClrLst meth="repeat">
+      <a:schemeClr val="tx1"/>
+    </dgm:txFillClrLst>
+    <dgm:txEffectClrLst/>
+  </dgm:styleLbl>
+  <dgm:styleLbl name="fgAcc1">
+    <dgm:fillClrLst meth="repeat">
+      <a:schemeClr val="lt1">
+        <a:alpha val="90000"/>
+      </a:schemeClr>
+    </dgm:fillClrLst>
+    <dgm:linClrLst meth="repeat">
+      <a:schemeClr val="accent1"/>
+    </dgm:linClrLst>
+    <dgm:effectClrLst/>
+    <dgm:txLinClrLst/>
+    <dgm:txFillClrLst meth="repeat">
+      <a:schemeClr val="dk1"/>
+    </dgm:txFillClrLst>
+    <dgm:txEffectClrLst/>
+  </dgm:styleLbl>
+  <dgm:styleLbl name="conFgAcc1">
+    <dgm:fillClrLst meth="repeat">
+      <a:schemeClr val="lt1">
+        <a:alpha val="90000"/>
+      </a:schemeClr>
+    </dgm:fillClrLst>
+    <dgm:linClrLst meth="repeat">
+      <a:schemeClr val="accent1"/>
+    </dgm:linClrLst>
+    <dgm:effectClrLst/>
+    <dgm:txLinClrLst/>
+    <dgm:txFillClrLst meth="repeat">
+      <a:schemeClr val="dk1"/>
+    </dgm:txFillClrLst>
+    <dgm:txEffectClrLst/>
+  </dgm:styleLbl>
+  <dgm:styleLbl name="alignAcc1">
+    <dgm:fillClrLst meth="repeat">
+      <a:schemeClr val="lt1">
+        <a:alpha val="90000"/>
+      </a:schemeClr>
+    </dgm:fillClrLst>
+    <dgm:linClrLst meth="repeat">
+      <a:schemeClr val="accent1"/>
+    </dgm:linClrLst>
+    <dgm:effectClrLst/>
+    <dgm:txLinClrLst/>
+    <dgm:txFillClrLst meth="repeat">
+      <a:schemeClr val="dk1"/>
+    </dgm:txFillClrLst>
+    <dgm:txEffectClrLst/>
+  </dgm:styleLbl>
+  <dgm:styleLbl name="trAlignAcc1">
+    <dgm:fillClrLst meth="repeat">
+      <a:schemeClr val="lt1">
+        <a:alpha val="40000"/>
+      </a:schemeClr>
+    </dgm:fillClrLst>
+    <dgm:linClrLst meth="repeat">
+      <a:schemeClr val="accent1"/>
+    </dgm:linClrLst>
+    <dgm:effectClrLst/>
+    <dgm:txLinClrLst/>
+    <dgm:txFillClrLst meth="repeat">
+      <a:schemeClr val="dk1"/>
+    </dgm:txFillClrLst>
+    <dgm:txEffectClrLst/>
+  </dgm:styleLbl>
+  <dgm:styleLbl name="bgAcc1">
+    <dgm:fillClrLst meth="repeat">
+      <a:schemeClr val="lt1">
+        <a:alpha val="90000"/>
+      </a:schemeClr>
+    </dgm:fillClrLst>
+    <dgm:linClrLst meth="repeat">
+      <a:schemeClr val="accent1"/>
+    </dgm:linClrLst>
+    <dgm:effectClrLst/>
+    <dgm:txLinClrLst/>
+    <dgm:txFillClrLst meth="repeat">
+      <a:schemeClr val="dk1"/>
+    </dgm:txFillClrLst>
+    <dgm:txEffectClrLst/>
+  </dgm:styleLbl>
+  <dgm:styleLbl name="solidFgAcc1">
+    <dgm:fillClrLst meth="repeat">
+      <a:schemeClr val="lt1"/>
+    </dgm:fillClrLst>
+    <dgm:linClrLst meth="repeat">
+      <a:schemeClr val="accent1"/>
+    </dgm:linClrLst>
+    <dgm:effectClrLst/>
+    <dgm:txLinClrLst/>
+    <dgm:txFillClrLst meth="repeat">
+      <a:schemeClr val="dk1"/>
+    </dgm:txFillClrLst>
+    <dgm:txEffectClrLst/>
+  </dgm:styleLbl>
+  <dgm:styleLbl name="solidAlignAcc1">
+    <dgm:fillClrLst meth="repeat">
+      <a:schemeClr val="lt1"/>
+    </dgm:fillClrLst>
+    <dgm:linClrLst meth="repeat">
+      <a:schemeClr val="accent1"/>
+    </dgm:linClrLst>
+    <dgm:effectClrLst/>
+    <dgm:txLinClrLst/>
+    <dgm:txFillClrLst meth="repeat">
+      <a:schemeClr val="dk1"/>
+    </dgm:txFillClrLst>
+    <dgm:txEffectClrLst/>
+  </dgm:styleLbl>
+  <dgm:styleLbl name="solidBgAcc1">
+    <dgm:fillClrLst meth="repeat">
+      <a:schemeClr val="lt1"/>
+    </dgm:fillClrLst>
+    <dgm:linClrLst meth="repeat">
+      <a:schemeClr val="accent1"/>
+    </dgm:linClrLst>
+    <dgm:effectClrLst/>
+    <dgm:txLinClrLst/>
+    <dgm:txFillClrLst meth="repeat">
+      <a:schemeClr val="dk1"/>
+    </dgm:txFillClrLst>
+    <dgm:txEffectClrLst/>
+  </dgm:styleLbl>
+  <dgm:styleLbl name="fgAccFollowNode1">
+    <dgm:fillClrLst meth="repeat">
+      <a:schemeClr val="accent1">
+        <a:alpha val="90000"/>
+        <a:tint val="40000"/>
+      </a:schemeClr>
+    </dgm:fillClrLst>
+    <dgm:linClrLst meth="repeat">
+      <a:schemeClr val="accent1">
+        <a:alpha val="90000"/>
+        <a:tint val="40000"/>
+      </a:schemeClr>
+    </dgm:linClrLst>
+    <dgm:effectClrLst/>
+    <dgm:txLinClrLst/>
+    <dgm:txFillClrLst meth="repeat">
+      <a:schemeClr val="dk1"/>
+    </dgm:txFillClrLst>
+    <dgm:txEffectClrLst/>
+  </dgm:styleLbl>
+  <dgm:styleLbl name="alignAccFollowNode1">
+    <dgm:fillClrLst meth="repeat">
+      <a:schemeClr val="accent1">
+        <a:alpha val="90000"/>
+        <a:tint val="40000"/>
+      </a:schemeClr>
+    </dgm:fillClrLst>
+    <dgm:linClrLst meth="repeat">
+      <a:schemeClr val="accent1">
+        <a:alpha val="90000"/>
+        <a:tint val="40000"/>
+      </a:schemeClr>
+    </dgm:linClrLst>
+    <dgm:effectClrLst/>
+    <dgm:txLinClrLst/>
+    <dgm:txFillClrLst meth="repeat">
+      <a:schemeClr val="dk1"/>
+    </dgm:txFillClrLst>
+    <dgm:txEffectClrLst/>
+  </dgm:styleLbl>
+  <dgm:styleLbl name="bgAccFollowNode1">
+    <dgm:fillClrLst meth="repeat">
+      <a:schemeClr val="accent1">
+        <a:alpha val="90000"/>
+        <a:tint val="40000"/>
+      </a:schemeClr>
+    </dgm:fillClrLst>
+    <dgm:linClrLst meth="repeat">
+      <a:schemeClr val="accent1">
+        <a:alpha val="90000"/>
+        <a:tint val="40000"/>
+      </a:schemeClr>
+    </dgm:linClrLst>
+    <dgm:effectClrLst/>
+    <dgm:txLinClrLst/>
+    <dgm:txFillClrLst meth="repeat">
+      <a:schemeClr val="dk1"/>
+    </dgm:txFillClrLst>
+    <dgm:txEffectClrLst/>
+  </dgm:styleLbl>
+  <dgm:styleLbl name="fgAcc0">
+    <dgm:fillClrLst meth="repeat">
+      <a:schemeClr val="lt1">
+        <a:alpha val="90000"/>
+      </a:schemeClr>
+    </dgm:fillClrLst>
+    <dgm:linClrLst meth="repeat">
+      <a:schemeClr val="accent1"/>
+    </dgm:linClrLst>
+    <dgm:effectClrLst/>
+    <dgm:txLinClrLst/>
+    <dgm:txFillClrLst meth="repeat">
+      <a:schemeClr val="dk1"/>
+    </dgm:txFillClrLst>
+    <dgm:txEffectClrLst/>
+  </dgm:styleLbl>
+  <dgm:styleLbl name="fgAcc2">
+    <dgm:fillClrLst meth="repeat">
+      <a:schemeClr val="lt1">
+        <a:alpha val="90000"/>
+      </a:schemeClr>
+    </dgm:fillClrLst>
+    <dgm:linClrLst meth="repeat">
+      <a:schemeClr val="accent1"/>
+    </dgm:linClrLst>
+    <dgm:effectClrLst/>
+    <dgm:txLinClrLst/>
+    <dgm:txFillClrLst meth="repeat">
+      <a:schemeClr val="dk1"/>
+    </dgm:txFillClrLst>
+    <dgm:txEffectClrLst/>
+  </dgm:styleLbl>
+  <dgm:styleLbl name="fgAcc3">
+    <dgm:fillClrLst meth="repeat">
+      <a:schemeClr val="lt1">
+        <a:alpha val="90000"/>
+      </a:schemeClr>
+    </dgm:fillClrLst>
+    <dgm:linClrLst meth="repeat">
+      <a:schemeClr val="accent1"/>
+    </dgm:linClrLst>
+    <dgm:effectClrLst/>
+    <dgm:txLinClrLst/>
+    <dgm:txFillClrLst meth="repeat">
+      <a:schemeClr val="dk1"/>
+    </dgm:txFillClrLst>
+    <dgm:txEffectClrLst/>
+  </dgm:styleLbl>
+  <dgm:styleLbl name="fgAcc4">
+    <dgm:fillClrLst meth="repeat">
+      <a:schemeClr val="lt1">
+        <a:alpha val="90000"/>
+      </a:schemeClr>
+    </dgm:fillClrLst>
+    <dgm:linClrLst meth="repeat">
+      <a:schemeClr val="accent1"/>
+    </dgm:linClrLst>
+    <dgm:effectClrLst/>
+    <dgm:txLinClrLst/>
+    <dgm:txFillClrLst meth="repeat">
+      <a:schemeClr val="dk1"/>
+    </dgm:txFillClrLst>
+    <dgm:txEffectClrLst/>
+  </dgm:styleLbl>
+  <dgm:styleLbl name="bgShp">
+    <dgm:fillClrLst meth="repeat">
+      <a:schemeClr val="accent1">
+        <a:tint val="40000"/>
+      </a:schemeClr>
+    </dgm:fillClrLst>
+    <dgm:linClrLst meth="repeat">
+      <a:schemeClr val="accent1"/>
+    </dgm:linClrLst>
+    <dgm:effectClrLst/>
+    <dgm:txLinClrLst/>
+    <dgm:txFillClrLst meth="repeat">
+      <a:schemeClr val="dk1"/>
+    </dgm:txFillClrLst>
+    <dgm:txEffectClrLst/>
+  </dgm:styleLbl>
+  <dgm:styleLbl name="dkBgShp">
+    <dgm:fillClrLst meth="repeat">
+      <a:schemeClr val="accent1">
+        <a:shade val="80000"/>
+      </a:schemeClr>
+    </dgm:fillClrLst>
+    <dgm:linClrLst meth="repeat">
+      <a:schemeClr val="accent1"/>
+    </dgm:linClrLst>
+    <dgm:effectClrLst/>
+    <dgm:txLinClrLst/>
+    <dgm:txFillClrLst meth="repeat">
+      <a:schemeClr val="lt1"/>
+    </dgm:txFillClrLst>
+    <dgm:txEffectClrLst/>
+  </dgm:styleLbl>
+  <dgm:styleLbl name="trBgShp">
+    <dgm:fillClrLst meth="repeat">
+      <a:schemeClr val="accent1">
+        <a:tint val="50000"/>
+        <a:alpha val="40000"/>
+      </a:schemeClr>
+    </dgm:fillClrLst>
+    <dgm:linClrLst meth="repeat">
+      <a:schemeClr val="accent1"/>
+    </dgm:linClrLst>
+    <dgm:effectClrLst/>
+    <dgm:txLinClrLst/>
+    <dgm:txFillClrLst meth="repeat">
+      <a:schemeClr val="lt1"/>
+    </dgm:txFillClrLst>
+    <dgm:txEffectClrLst/>
+  </dgm:styleLbl>
+  <dgm:styleLbl name="fgShp">
+    <dgm:fillClrLst meth="repeat">
+      <a:schemeClr val="accent1">
+        <a:tint val="60000"/>
+      </a:schemeClr>
+    </dgm:fillClrLst>
+    <dgm:linClrLst meth="repeat">
+      <a:schemeClr val="lt1"/>
+    </dgm:linClrLst>
+    <dgm:effectClrLst/>
+    <dgm:txLinClrLst/>
+    <dgm:txFillClrLst meth="repeat">
+      <a:schemeClr val="dk1"/>
+    </dgm:txFillClrLst>
+    <dgm:txEffectClrLst/>
+  </dgm:styleLbl>
+  <dgm:styleLbl name="revTx">
+    <dgm:fillClrLst meth="repeat">
+      <a:schemeClr val="lt1">
+        <a:alpha val="0"/>
+      </a:schemeClr>
+    </dgm:fillClrLst>
+    <dgm:linClrLst meth="repeat">
+      <a:schemeClr val="dk1">
+        <a:alpha val="0"/>
+      </a:schemeClr>
+    </dgm:linClrLst>
+    <dgm:effectClrLst/>
+    <dgm:txLinClrLst/>
+    <dgm:txFillClrLst meth="repeat">
+      <a:schemeClr val="tx1"/>
+    </dgm:txFillClrLst>
+    <dgm:txEffectClrLst/>
+  </dgm:styleLbl>
+</dgm:colorsDef>
+</file>
+
+<file path=ppt/diagrams/colors3.xml><?xml version="1.0" encoding="utf-8"?>
 <dgm:colorsDef xmlns:dgm="http://schemas.openxmlformats.org/drawingml/2006/diagram" xmlns:a="http://schemas.openxmlformats.org/drawingml/2006/main" uniqueId="urn:microsoft.com/office/officeart/2018/5/colors/Iconchunking_neutralicontext_colorful1">
   <dgm:title val=""/>
   <dgm:desc val=""/>
@@ -1793,7 +2545,7 @@
 </dgm:colorsDef>
 </file>
 
-<file path=ppt/diagrams/colors3.xml><?xml version="1.0" encoding="utf-8"?>
+<file path=ppt/diagrams/colors4.xml><?xml version="1.0" encoding="utf-8"?>
 <dgm:colorsDef xmlns:dgm="http://schemas.openxmlformats.org/drawingml/2006/diagram" xmlns:a="http://schemas.openxmlformats.org/drawingml/2006/main" uniqueId="urn:microsoft.com/office/officeart/2005/8/colors/colorful5">
   <dgm:title val=""/>
   <dgm:desc val=""/>
@@ -2575,7 +3327,7 @@
 </dgm:colorsDef>
 </file>
 
-<file path=ppt/diagrams/colors4.xml><?xml version="1.0" encoding="utf-8"?>
+<file path=ppt/diagrams/colors5.xml><?xml version="1.0" encoding="utf-8"?>
 <dgm:colorsDef xmlns:dgm="http://schemas.openxmlformats.org/drawingml/2006/diagram" xmlns:a="http://schemas.openxmlformats.org/drawingml/2006/main" uniqueId="urn:microsoft.com/office/officeart/2018/5/colors/Iconchunking_neutralbg_colorful1">
   <dgm:title val=""/>
   <dgm:desc val=""/>
@@ -3715,6 +4467,354 @@
 </file>
 
 <file path=ppt/diagrams/data2.xml><?xml version="1.0" encoding="utf-8"?>
+<dgm:dataModel xmlns:dgm="http://schemas.openxmlformats.org/drawingml/2006/diagram" xmlns:a="http://schemas.openxmlformats.org/drawingml/2006/main">
+  <dgm:ptLst>
+    <dgm:pt modelId="{F59A8070-4797-4F7D-85D4-50689E6F4F18}" type="doc">
+      <dgm:prSet loTypeId="urn:microsoft.com/office/officeart/2005/8/layout/vList5" loCatId="list" qsTypeId="urn:microsoft.com/office/officeart/2005/8/quickstyle/simple1" qsCatId="simple" csTypeId="urn:microsoft.com/office/officeart/2005/8/colors/accent1_2" csCatId="accent1"/>
+      <dgm:spPr/>
+      <dgm:t>
+        <a:bodyPr/>
+        <a:lstStyle/>
+        <a:p>
+          <a:endParaRPr lang="en-US"/>
+        </a:p>
+      </dgm:t>
+    </dgm:pt>
+    <dgm:pt modelId="{FDD62E21-C02F-44DA-8C34-67858F9DA7FE}">
+      <dgm:prSet/>
+      <dgm:spPr/>
+      <dgm:t>
+        <a:bodyPr/>
+        <a:lstStyle/>
+        <a:p>
+          <a:r>
+            <a:rPr lang="en-US"/>
+            <a:t>Task 1 Output  </a:t>
+          </a:r>
+        </a:p>
+      </dgm:t>
+    </dgm:pt>
+    <dgm:pt modelId="{B3DA7C49-AEBA-41DB-9671-8E5A5BCB4F99}" type="parTrans" cxnId="{E1853224-DAF7-4E25-AB89-9BED3C46B712}">
+      <dgm:prSet/>
+      <dgm:spPr/>
+      <dgm:t>
+        <a:bodyPr/>
+        <a:lstStyle/>
+        <a:p>
+          <a:endParaRPr lang="en-US"/>
+        </a:p>
+      </dgm:t>
+    </dgm:pt>
+    <dgm:pt modelId="{2CBA475B-D97D-4261-BB7D-83774E126F50}" type="sibTrans" cxnId="{E1853224-DAF7-4E25-AB89-9BED3C46B712}">
+      <dgm:prSet/>
+      <dgm:spPr/>
+      <dgm:t>
+        <a:bodyPr/>
+        <a:lstStyle/>
+        <a:p>
+          <a:endParaRPr lang="en-US"/>
+        </a:p>
+      </dgm:t>
+    </dgm:pt>
+    <dgm:pt modelId="{EA5C8A4B-35F8-4110-BE8A-2BBD9A13064B}">
+      <dgm:prSet/>
+      <dgm:spPr/>
+      <dgm:t>
+        <a:bodyPr/>
+        <a:lstStyle/>
+        <a:p>
+          <a:r>
+            <a:rPr lang="en-US"/>
+            <a:t>.xlsx</a:t>
+          </a:r>
+        </a:p>
+      </dgm:t>
+    </dgm:pt>
+    <dgm:pt modelId="{EA791327-F110-4F8E-8260-D64FE8CD68D4}" type="parTrans" cxnId="{046618E9-68EE-4529-BAB0-AF1AE5DF87FC}">
+      <dgm:prSet/>
+      <dgm:spPr/>
+      <dgm:t>
+        <a:bodyPr/>
+        <a:lstStyle/>
+        <a:p>
+          <a:endParaRPr lang="en-US"/>
+        </a:p>
+      </dgm:t>
+    </dgm:pt>
+    <dgm:pt modelId="{633398BA-56B7-496F-A2E0-FD99570DCC3D}" type="sibTrans" cxnId="{046618E9-68EE-4529-BAB0-AF1AE5DF87FC}">
+      <dgm:prSet/>
+      <dgm:spPr/>
+      <dgm:t>
+        <a:bodyPr/>
+        <a:lstStyle/>
+        <a:p>
+          <a:endParaRPr lang="en-US"/>
+        </a:p>
+      </dgm:t>
+    </dgm:pt>
+    <dgm:pt modelId="{4DAEAAA0-802D-4575-89C4-370C5D9B881D}">
+      <dgm:prSet/>
+      <dgm:spPr/>
+      <dgm:t>
+        <a:bodyPr/>
+        <a:lstStyle/>
+        <a:p>
+          <a:r>
+            <a:rPr lang="en-US"/>
+            <a:t>Auxiliary Metadata</a:t>
+          </a:r>
+        </a:p>
+      </dgm:t>
+    </dgm:pt>
+    <dgm:pt modelId="{6B82C1D0-D908-428D-BF51-48B8D1AF85F7}" type="parTrans" cxnId="{744DCB9A-AE63-4DCE-B0BA-C1151E74D372}">
+      <dgm:prSet/>
+      <dgm:spPr/>
+      <dgm:t>
+        <a:bodyPr/>
+        <a:lstStyle/>
+        <a:p>
+          <a:endParaRPr lang="en-US"/>
+        </a:p>
+      </dgm:t>
+    </dgm:pt>
+    <dgm:pt modelId="{AE9211E4-F4F9-4387-92BA-ED290A40BCC0}" type="sibTrans" cxnId="{744DCB9A-AE63-4DCE-B0BA-C1151E74D372}">
+      <dgm:prSet/>
+      <dgm:spPr/>
+      <dgm:t>
+        <a:bodyPr/>
+        <a:lstStyle/>
+        <a:p>
+          <a:endParaRPr lang="en-US"/>
+        </a:p>
+      </dgm:t>
+    </dgm:pt>
+    <dgm:pt modelId="{56C8A288-8DFF-4248-BD08-4BE97B52A9F8}">
+      <dgm:prSet/>
+      <dgm:spPr/>
+      <dgm:t>
+        <a:bodyPr/>
+        <a:lstStyle/>
+        <a:p>
+          <a:r>
+            <a:rPr lang="en-US"/>
+            <a:t>.json</a:t>
+          </a:r>
+        </a:p>
+      </dgm:t>
+    </dgm:pt>
+    <dgm:pt modelId="{E5A39DC8-FDB3-4C68-9DFE-6F17D9D67C73}" type="parTrans" cxnId="{4521374A-CF17-4BFA-901D-E6B0090E7E96}">
+      <dgm:prSet/>
+      <dgm:spPr/>
+      <dgm:t>
+        <a:bodyPr/>
+        <a:lstStyle/>
+        <a:p>
+          <a:endParaRPr lang="en-US"/>
+        </a:p>
+      </dgm:t>
+    </dgm:pt>
+    <dgm:pt modelId="{6E524DCD-F146-4053-BD2D-A9B15BD722E5}" type="sibTrans" cxnId="{4521374A-CF17-4BFA-901D-E6B0090E7E96}">
+      <dgm:prSet/>
+      <dgm:spPr/>
+      <dgm:t>
+        <a:bodyPr/>
+        <a:lstStyle/>
+        <a:p>
+          <a:endParaRPr lang="en-US"/>
+        </a:p>
+      </dgm:t>
+    </dgm:pt>
+    <dgm:pt modelId="{5166C442-23D9-4504-83C6-57B445935A9D}">
+      <dgm:prSet/>
+      <dgm:spPr/>
+      <dgm:t>
+        <a:bodyPr/>
+        <a:lstStyle/>
+        <a:p>
+          <a:r>
+            <a:rPr lang="en-US"/>
+            <a:t>Task 2 Output : Count Vectoriser and Vocab List</a:t>
+          </a:r>
+        </a:p>
+      </dgm:t>
+    </dgm:pt>
+    <dgm:pt modelId="{4B9E18B0-CBC5-408F-8840-ECD93368BA00}" type="parTrans" cxnId="{6321F81A-362F-4B7A-9367-0031FB1D853D}">
+      <dgm:prSet/>
+      <dgm:spPr/>
+      <dgm:t>
+        <a:bodyPr/>
+        <a:lstStyle/>
+        <a:p>
+          <a:endParaRPr lang="en-US"/>
+        </a:p>
+      </dgm:t>
+    </dgm:pt>
+    <dgm:pt modelId="{07170D68-4796-442E-A1F8-EC52B7D88449}" type="sibTrans" cxnId="{6321F81A-362F-4B7A-9367-0031FB1D853D}">
+      <dgm:prSet/>
+      <dgm:spPr/>
+      <dgm:t>
+        <a:bodyPr/>
+        <a:lstStyle/>
+        <a:p>
+          <a:endParaRPr lang="en-US"/>
+        </a:p>
+      </dgm:t>
+    </dgm:pt>
+    <dgm:pt modelId="{E1BBD942-87B0-4A7C-B30E-9908D6D973B2}">
+      <dgm:prSet/>
+      <dgm:spPr/>
+      <dgm:t>
+        <a:bodyPr/>
+        <a:lstStyle/>
+        <a:p>
+          <a:r>
+            <a:rPr lang="en-US" dirty="0"/>
+            <a:t>.txt </a:t>
+          </a:r>
+        </a:p>
+      </dgm:t>
+    </dgm:pt>
+    <dgm:pt modelId="{DA221BA0-89E0-4788-BC7A-803B99316643}" type="parTrans" cxnId="{C306E60D-B6DF-4C52-B0C9-657B21D8A364}">
+      <dgm:prSet/>
+      <dgm:spPr/>
+      <dgm:t>
+        <a:bodyPr/>
+        <a:lstStyle/>
+        <a:p>
+          <a:endParaRPr lang="en-US"/>
+        </a:p>
+      </dgm:t>
+    </dgm:pt>
+    <dgm:pt modelId="{80EC1FBA-192A-4A09-BAFF-C0538E63D185}" type="sibTrans" cxnId="{C306E60D-B6DF-4C52-B0C9-657B21D8A364}">
+      <dgm:prSet/>
+      <dgm:spPr/>
+      <dgm:t>
+        <a:bodyPr/>
+        <a:lstStyle/>
+        <a:p>
+          <a:endParaRPr lang="en-US"/>
+        </a:p>
+      </dgm:t>
+    </dgm:pt>
+    <dgm:pt modelId="{8DFC4454-69CB-44D8-8D5D-FD13B8085965}" type="pres">
+      <dgm:prSet presAssocID="{F59A8070-4797-4F7D-85D4-50689E6F4F18}" presName="Name0" presStyleCnt="0">
+        <dgm:presLayoutVars>
+          <dgm:dir/>
+          <dgm:animLvl val="lvl"/>
+          <dgm:resizeHandles val="exact"/>
+        </dgm:presLayoutVars>
+      </dgm:prSet>
+      <dgm:spPr/>
+    </dgm:pt>
+    <dgm:pt modelId="{DEAA8E9A-5CFE-41BA-B2FF-5E8535512E58}" type="pres">
+      <dgm:prSet presAssocID="{FDD62E21-C02F-44DA-8C34-67858F9DA7FE}" presName="linNode" presStyleCnt="0"/>
+      <dgm:spPr/>
+    </dgm:pt>
+    <dgm:pt modelId="{EBA3E521-014B-4F1A-A66B-54866EFB3CE7}" type="pres">
+      <dgm:prSet presAssocID="{FDD62E21-C02F-44DA-8C34-67858F9DA7FE}" presName="parentText" presStyleLbl="node1" presStyleIdx="0" presStyleCnt="3">
+        <dgm:presLayoutVars>
+          <dgm:chMax val="1"/>
+          <dgm:bulletEnabled val="1"/>
+        </dgm:presLayoutVars>
+      </dgm:prSet>
+      <dgm:spPr/>
+    </dgm:pt>
+    <dgm:pt modelId="{3C4C43DE-ECFF-4362-B675-3AFE4C390960}" type="pres">
+      <dgm:prSet presAssocID="{FDD62E21-C02F-44DA-8C34-67858F9DA7FE}" presName="descendantText" presStyleLbl="alignAccFollowNode1" presStyleIdx="0" presStyleCnt="3">
+        <dgm:presLayoutVars>
+          <dgm:bulletEnabled val="1"/>
+        </dgm:presLayoutVars>
+      </dgm:prSet>
+      <dgm:spPr/>
+    </dgm:pt>
+    <dgm:pt modelId="{6C4975D3-0382-44AD-B232-EBECF263F17E}" type="pres">
+      <dgm:prSet presAssocID="{2CBA475B-D97D-4261-BB7D-83774E126F50}" presName="sp" presStyleCnt="0"/>
+      <dgm:spPr/>
+    </dgm:pt>
+    <dgm:pt modelId="{6AF80A2A-B528-44F4-8A5D-D9E457A22EA5}" type="pres">
+      <dgm:prSet presAssocID="{4DAEAAA0-802D-4575-89C4-370C5D9B881D}" presName="linNode" presStyleCnt="0"/>
+      <dgm:spPr/>
+    </dgm:pt>
+    <dgm:pt modelId="{09781AA9-04FB-4801-A2A2-915D02037DD9}" type="pres">
+      <dgm:prSet presAssocID="{4DAEAAA0-802D-4575-89C4-370C5D9B881D}" presName="parentText" presStyleLbl="node1" presStyleIdx="1" presStyleCnt="3">
+        <dgm:presLayoutVars>
+          <dgm:chMax val="1"/>
+          <dgm:bulletEnabled val="1"/>
+        </dgm:presLayoutVars>
+      </dgm:prSet>
+      <dgm:spPr/>
+    </dgm:pt>
+    <dgm:pt modelId="{A14B41F0-A410-4707-A56D-9689EF7C496D}" type="pres">
+      <dgm:prSet presAssocID="{4DAEAAA0-802D-4575-89C4-370C5D9B881D}" presName="descendantText" presStyleLbl="alignAccFollowNode1" presStyleIdx="1" presStyleCnt="3">
+        <dgm:presLayoutVars>
+          <dgm:bulletEnabled val="1"/>
+        </dgm:presLayoutVars>
+      </dgm:prSet>
+      <dgm:spPr/>
+    </dgm:pt>
+    <dgm:pt modelId="{C73C8DE2-C2F2-4300-B3D3-559A77683F25}" type="pres">
+      <dgm:prSet presAssocID="{AE9211E4-F4F9-4387-92BA-ED290A40BCC0}" presName="sp" presStyleCnt="0"/>
+      <dgm:spPr/>
+    </dgm:pt>
+    <dgm:pt modelId="{8EAB452F-1046-4347-B2C4-8442E927715A}" type="pres">
+      <dgm:prSet presAssocID="{5166C442-23D9-4504-83C6-57B445935A9D}" presName="linNode" presStyleCnt="0"/>
+      <dgm:spPr/>
+    </dgm:pt>
+    <dgm:pt modelId="{5573F7DA-646D-4491-A0DC-1FDAF92E2CE3}" type="pres">
+      <dgm:prSet presAssocID="{5166C442-23D9-4504-83C6-57B445935A9D}" presName="parentText" presStyleLbl="node1" presStyleIdx="2" presStyleCnt="3">
+        <dgm:presLayoutVars>
+          <dgm:chMax val="1"/>
+          <dgm:bulletEnabled val="1"/>
+        </dgm:presLayoutVars>
+      </dgm:prSet>
+      <dgm:spPr/>
+    </dgm:pt>
+    <dgm:pt modelId="{BFBB616B-9497-4B97-9ED2-CD5E9DC8D57B}" type="pres">
+      <dgm:prSet presAssocID="{5166C442-23D9-4504-83C6-57B445935A9D}" presName="descendantText" presStyleLbl="alignAccFollowNode1" presStyleIdx="2" presStyleCnt="3">
+        <dgm:presLayoutVars>
+          <dgm:bulletEnabled val="1"/>
+        </dgm:presLayoutVars>
+      </dgm:prSet>
+      <dgm:spPr/>
+    </dgm:pt>
+  </dgm:ptLst>
+  <dgm:cxnLst>
+    <dgm:cxn modelId="{C306E60D-B6DF-4C52-B0C9-657B21D8A364}" srcId="{5166C442-23D9-4504-83C6-57B445935A9D}" destId="{E1BBD942-87B0-4A7C-B30E-9908D6D973B2}" srcOrd="0" destOrd="0" parTransId="{DA221BA0-89E0-4788-BC7A-803B99316643}" sibTransId="{80EC1FBA-192A-4A09-BAFF-C0538E63D185}"/>
+    <dgm:cxn modelId="{6321F81A-362F-4B7A-9367-0031FB1D853D}" srcId="{F59A8070-4797-4F7D-85D4-50689E6F4F18}" destId="{5166C442-23D9-4504-83C6-57B445935A9D}" srcOrd="2" destOrd="0" parTransId="{4B9E18B0-CBC5-408F-8840-ECD93368BA00}" sibTransId="{07170D68-4796-442E-A1F8-EC52B7D88449}"/>
+    <dgm:cxn modelId="{E1853224-DAF7-4E25-AB89-9BED3C46B712}" srcId="{F59A8070-4797-4F7D-85D4-50689E6F4F18}" destId="{FDD62E21-C02F-44DA-8C34-67858F9DA7FE}" srcOrd="0" destOrd="0" parTransId="{B3DA7C49-AEBA-41DB-9671-8E5A5BCB4F99}" sibTransId="{2CBA475B-D97D-4261-BB7D-83774E126F50}"/>
+    <dgm:cxn modelId="{D8DE2A2E-C835-44BE-8FC8-747D21359296}" type="presOf" srcId="{56C8A288-8DFF-4248-BD08-4BE97B52A9F8}" destId="{A14B41F0-A410-4707-A56D-9689EF7C496D}" srcOrd="0" destOrd="0" presId="urn:microsoft.com/office/officeart/2005/8/layout/vList5"/>
+    <dgm:cxn modelId="{DD941941-2589-48D0-8B79-32B35729C35E}" type="presOf" srcId="{E1BBD942-87B0-4A7C-B30E-9908D6D973B2}" destId="{BFBB616B-9497-4B97-9ED2-CD5E9DC8D57B}" srcOrd="0" destOrd="0" presId="urn:microsoft.com/office/officeart/2005/8/layout/vList5"/>
+    <dgm:cxn modelId="{4521374A-CF17-4BFA-901D-E6B0090E7E96}" srcId="{4DAEAAA0-802D-4575-89C4-370C5D9B881D}" destId="{56C8A288-8DFF-4248-BD08-4BE97B52A9F8}" srcOrd="0" destOrd="0" parTransId="{E5A39DC8-FDB3-4C68-9DFE-6F17D9D67C73}" sibTransId="{6E524DCD-F146-4053-BD2D-A9B15BD722E5}"/>
+    <dgm:cxn modelId="{DDDC7D4B-BF39-4426-9A1A-B4E7F5376BF5}" type="presOf" srcId="{F59A8070-4797-4F7D-85D4-50689E6F4F18}" destId="{8DFC4454-69CB-44D8-8D5D-FD13B8085965}" srcOrd="0" destOrd="0" presId="urn:microsoft.com/office/officeart/2005/8/layout/vList5"/>
+    <dgm:cxn modelId="{A16AB173-702F-4E1B-B3C8-6BBCFECE1737}" type="presOf" srcId="{5166C442-23D9-4504-83C6-57B445935A9D}" destId="{5573F7DA-646D-4491-A0DC-1FDAF92E2CE3}" srcOrd="0" destOrd="0" presId="urn:microsoft.com/office/officeart/2005/8/layout/vList5"/>
+    <dgm:cxn modelId="{744DCB9A-AE63-4DCE-B0BA-C1151E74D372}" srcId="{F59A8070-4797-4F7D-85D4-50689E6F4F18}" destId="{4DAEAAA0-802D-4575-89C4-370C5D9B881D}" srcOrd="1" destOrd="0" parTransId="{6B82C1D0-D908-428D-BF51-48B8D1AF85F7}" sibTransId="{AE9211E4-F4F9-4387-92BA-ED290A40BCC0}"/>
+    <dgm:cxn modelId="{F33EB8C6-7AA5-44A7-8D82-272B4A4665FF}" type="presOf" srcId="{EA5C8A4B-35F8-4110-BE8A-2BBD9A13064B}" destId="{3C4C43DE-ECFF-4362-B675-3AFE4C390960}" srcOrd="0" destOrd="0" presId="urn:microsoft.com/office/officeart/2005/8/layout/vList5"/>
+    <dgm:cxn modelId="{9F7212D9-532B-4307-A7E4-98CEBC6AC70B}" type="presOf" srcId="{4DAEAAA0-802D-4575-89C4-370C5D9B881D}" destId="{09781AA9-04FB-4801-A2A2-915D02037DD9}" srcOrd="0" destOrd="0" presId="urn:microsoft.com/office/officeart/2005/8/layout/vList5"/>
+    <dgm:cxn modelId="{E1E4C5DD-1A8D-42B7-BDB3-D53DC10AA130}" type="presOf" srcId="{FDD62E21-C02F-44DA-8C34-67858F9DA7FE}" destId="{EBA3E521-014B-4F1A-A66B-54866EFB3CE7}" srcOrd="0" destOrd="0" presId="urn:microsoft.com/office/officeart/2005/8/layout/vList5"/>
+    <dgm:cxn modelId="{046618E9-68EE-4529-BAB0-AF1AE5DF87FC}" srcId="{FDD62E21-C02F-44DA-8C34-67858F9DA7FE}" destId="{EA5C8A4B-35F8-4110-BE8A-2BBD9A13064B}" srcOrd="0" destOrd="0" parTransId="{EA791327-F110-4F8E-8260-D64FE8CD68D4}" sibTransId="{633398BA-56B7-496F-A2E0-FD99570DCC3D}"/>
+    <dgm:cxn modelId="{C557FEE3-71FF-4BF2-BE33-AD7CB8E7AA17}" type="presParOf" srcId="{8DFC4454-69CB-44D8-8D5D-FD13B8085965}" destId="{DEAA8E9A-5CFE-41BA-B2FF-5E8535512E58}" srcOrd="0" destOrd="0" presId="urn:microsoft.com/office/officeart/2005/8/layout/vList5"/>
+    <dgm:cxn modelId="{441F8A60-5BAF-4ABD-AB31-4735D2C27E9B}" type="presParOf" srcId="{DEAA8E9A-5CFE-41BA-B2FF-5E8535512E58}" destId="{EBA3E521-014B-4F1A-A66B-54866EFB3CE7}" srcOrd="0" destOrd="0" presId="urn:microsoft.com/office/officeart/2005/8/layout/vList5"/>
+    <dgm:cxn modelId="{4A6E08ED-2409-4CDE-8BD4-9577FA0FEF84}" type="presParOf" srcId="{DEAA8E9A-5CFE-41BA-B2FF-5E8535512E58}" destId="{3C4C43DE-ECFF-4362-B675-3AFE4C390960}" srcOrd="1" destOrd="0" presId="urn:microsoft.com/office/officeart/2005/8/layout/vList5"/>
+    <dgm:cxn modelId="{5B2E3FC1-E737-425F-A9FD-10C82CE40C92}" type="presParOf" srcId="{8DFC4454-69CB-44D8-8D5D-FD13B8085965}" destId="{6C4975D3-0382-44AD-B232-EBECF263F17E}" srcOrd="1" destOrd="0" presId="urn:microsoft.com/office/officeart/2005/8/layout/vList5"/>
+    <dgm:cxn modelId="{1F60D93E-FFA8-4D74-86C1-18FB5FABFE73}" type="presParOf" srcId="{8DFC4454-69CB-44D8-8D5D-FD13B8085965}" destId="{6AF80A2A-B528-44F4-8A5D-D9E457A22EA5}" srcOrd="2" destOrd="0" presId="urn:microsoft.com/office/officeart/2005/8/layout/vList5"/>
+    <dgm:cxn modelId="{1C789B9D-1B15-4DF0-A847-9B4643C3D517}" type="presParOf" srcId="{6AF80A2A-B528-44F4-8A5D-D9E457A22EA5}" destId="{09781AA9-04FB-4801-A2A2-915D02037DD9}" srcOrd="0" destOrd="0" presId="urn:microsoft.com/office/officeart/2005/8/layout/vList5"/>
+    <dgm:cxn modelId="{CD8814B2-2FC1-43E8-BBF9-6FA8165E434E}" type="presParOf" srcId="{6AF80A2A-B528-44F4-8A5D-D9E457A22EA5}" destId="{A14B41F0-A410-4707-A56D-9689EF7C496D}" srcOrd="1" destOrd="0" presId="urn:microsoft.com/office/officeart/2005/8/layout/vList5"/>
+    <dgm:cxn modelId="{B73A0331-89C9-4368-B1CF-EEF468A3B650}" type="presParOf" srcId="{8DFC4454-69CB-44D8-8D5D-FD13B8085965}" destId="{C73C8DE2-C2F2-4300-B3D3-559A77683F25}" srcOrd="3" destOrd="0" presId="urn:microsoft.com/office/officeart/2005/8/layout/vList5"/>
+    <dgm:cxn modelId="{1CC86019-A5B9-4995-A9A8-0FFEAD39EBDD}" type="presParOf" srcId="{8DFC4454-69CB-44D8-8D5D-FD13B8085965}" destId="{8EAB452F-1046-4347-B2C4-8442E927715A}" srcOrd="4" destOrd="0" presId="urn:microsoft.com/office/officeart/2005/8/layout/vList5"/>
+    <dgm:cxn modelId="{AF4B995D-F5CB-4C22-B1A7-54D2FDB929AA}" type="presParOf" srcId="{8EAB452F-1046-4347-B2C4-8442E927715A}" destId="{5573F7DA-646D-4491-A0DC-1FDAF92E2CE3}" srcOrd="0" destOrd="0" presId="urn:microsoft.com/office/officeart/2005/8/layout/vList5"/>
+    <dgm:cxn modelId="{C0F35640-911B-449B-828F-3E6A90B18167}" type="presParOf" srcId="{8EAB452F-1046-4347-B2C4-8442E927715A}" destId="{BFBB616B-9497-4B97-9ED2-CD5E9DC8D57B}" srcOrd="1" destOrd="0" presId="urn:microsoft.com/office/officeart/2005/8/layout/vList5"/>
+  </dgm:cxnLst>
+  <dgm:bg/>
+  <dgm:whole/>
+  <dgm:extLst>
+    <a:ext uri="http://schemas.microsoft.com/office/drawing/2008/diagram">
+      <dsp:dataModelExt xmlns:dsp="http://schemas.microsoft.com/office/drawing/2008/diagram" relId="rId6" minVer="http://schemas.openxmlformats.org/drawingml/2006/diagram"/>
+    </a:ext>
+  </dgm:extLst>
+</dgm:dataModel>
+</file>
+
+<file path=ppt/diagrams/data3.xml><?xml version="1.0" encoding="utf-8"?>
 <dgm:dataModel xmlns:dgm="http://schemas.openxmlformats.org/drawingml/2006/diagram" xmlns:a="http://schemas.openxmlformats.org/drawingml/2006/main">
   <dgm:ptLst>
     <dgm:pt modelId="{2264FDD2-225C-49FA-A78E-5D08C7D276C9}" type="doc">
@@ -4166,11 +5266,11 @@
 </dgm:dataModel>
 </file>
 
-<file path=ppt/diagrams/data3.xml><?xml version="1.0" encoding="utf-8"?>
+<file path=ppt/diagrams/data4.xml><?xml version="1.0" encoding="utf-8"?>
 <dgm:dataModel xmlns:dgm="http://schemas.openxmlformats.org/drawingml/2006/diagram" xmlns:a="http://schemas.openxmlformats.org/drawingml/2006/main">
   <dgm:ptLst>
     <dgm:pt modelId="{2E2EDDF6-6627-4900-8005-6EF5C7587AA1}" type="doc">
-      <dgm:prSet loTypeId="urn:microsoft.com/office/officeart/2005/8/layout/vList2" loCatId="list" qsTypeId="urn:microsoft.com/office/officeart/2005/8/quickstyle/simple4" qsCatId="simple" csTypeId="urn:microsoft.com/office/officeart/2005/8/colors/colorful5" csCatId="colorful"/>
+      <dgm:prSet loTypeId="urn:microsoft.com/office/officeart/2005/8/layout/vList2" loCatId="list" qsTypeId="urn:microsoft.com/office/officeart/2005/8/quickstyle/simple4" qsCatId="simple" csTypeId="urn:microsoft.com/office/officeart/2005/8/colors/colorful5" csCatId="colorful" phldr="1"/>
       <dgm:spPr/>
       <dgm:t>
         <a:bodyPr/>
@@ -4224,8 +5324,8 @@
         <a:lstStyle/>
         <a:p>
           <a:r>
-            <a:rPr lang="en-US"/>
-            <a:t>Aim to offer services which offer high return/value for customers, rather than catering towards luxury services that most people cannot afford</a:t>
+            <a:rPr lang="en-US" dirty="0"/>
+            <a:t>Aim to provide services which offer high return/value for customers, rather than catering towards luxury services that most people cannot afford</a:t>
           </a:r>
         </a:p>
       </dgm:t>
@@ -4252,42 +5352,6 @@
         </a:p>
       </dgm:t>
     </dgm:pt>
-    <dgm:pt modelId="{4D1F7629-FB79-49B2-90E5-403EB4C8D548}">
-      <dgm:prSet/>
-      <dgm:spPr/>
-      <dgm:t>
-        <a:bodyPr/>
-        <a:lstStyle/>
-        <a:p>
-          <a:r>
-            <a:rPr lang="en-US"/>
-            <a:t>No need to concern too much with locating in CBD</a:t>
-          </a:r>
-        </a:p>
-      </dgm:t>
-    </dgm:pt>
-    <dgm:pt modelId="{4DF9E837-A1ED-4503-9291-5770EE270103}" type="parTrans" cxnId="{9118DFC2-47AD-4364-8990-4E1B217AB527}">
-      <dgm:prSet/>
-      <dgm:spPr/>
-      <dgm:t>
-        <a:bodyPr/>
-        <a:lstStyle/>
-        <a:p>
-          <a:endParaRPr lang="en-US"/>
-        </a:p>
-      </dgm:t>
-    </dgm:pt>
-    <dgm:pt modelId="{56545537-4009-4AF5-84E1-087F9F5828AA}" type="sibTrans" cxnId="{9118DFC2-47AD-4364-8990-4E1B217AB527}">
-      <dgm:prSet/>
-      <dgm:spPr/>
-      <dgm:t>
-        <a:bodyPr/>
-        <a:lstStyle/>
-        <a:p>
-          <a:endParaRPr lang="en-US"/>
-        </a:p>
-      </dgm:t>
-    </dgm:pt>
     <dgm:pt modelId="{B38A4E73-71DE-4E71-9BB1-103C71524945}">
       <dgm:prSet/>
       <dgm:spPr/>
@@ -4296,8 +5360,8 @@
         <a:lstStyle/>
         <a:p>
           <a:r>
-            <a:rPr lang="en-US"/>
-            <a:t>Ensure business follows strict health regulations and protocols, as well as offer inclusive accessibility option </a:t>
+            <a:rPr lang="en-US" dirty="0"/>
+            <a:t>No need to concern too much with locating in CBD</a:t>
           </a:r>
         </a:p>
       </dgm:t>
@@ -4321,6 +5385,43 @@
         <a:lstStyle/>
         <a:p>
           <a:endParaRPr lang="en-US"/>
+        </a:p>
+      </dgm:t>
+    </dgm:pt>
+    <dgm:pt modelId="{1F317792-B0F3-4650-9706-A7DB497EFCFF}">
+      <dgm:prSet/>
+      <dgm:spPr/>
+      <dgm:t>
+        <a:bodyPr/>
+        <a:lstStyle/>
+        <a:p>
+          <a:r>
+            <a:rPr lang="en-US"/>
+            <a:t>Ensure business follows strict health regulations and protocols, as well as offer inclusive accessibility option </a:t>
+          </a:r>
+          <a:endParaRPr lang="en-AU"/>
+        </a:p>
+      </dgm:t>
+    </dgm:pt>
+    <dgm:pt modelId="{7E85A898-182A-4765-8977-B0121EEB2E69}" type="parTrans" cxnId="{428E5DDE-912A-44AB-B8C0-F7DFB7CB7A1E}">
+      <dgm:prSet/>
+      <dgm:spPr/>
+      <dgm:t>
+        <a:bodyPr/>
+        <a:lstStyle/>
+        <a:p>
+          <a:endParaRPr lang="en-AU"/>
+        </a:p>
+      </dgm:t>
+    </dgm:pt>
+    <dgm:pt modelId="{CDE0B68A-3636-44DE-9A37-B6E0792DDCEF}" type="sibTrans" cxnId="{428E5DDE-912A-44AB-B8C0-F7DFB7CB7A1E}">
+      <dgm:prSet/>
+      <dgm:spPr/>
+      <dgm:t>
+        <a:bodyPr/>
+        <a:lstStyle/>
+        <a:p>
+          <a:endParaRPr lang="en-AU"/>
         </a:p>
       </dgm:t>
     </dgm:pt>
@@ -4359,8 +5460,8 @@
       <dgm:prSet presAssocID="{D7B40C88-639B-4A1E-8369-474E3DC0288D}" presName="spacer" presStyleCnt="0"/>
       <dgm:spPr/>
     </dgm:pt>
-    <dgm:pt modelId="{EF108312-EA60-4479-8F32-20DB5371A001}" type="pres">
-      <dgm:prSet presAssocID="{4D1F7629-FB79-49B2-90E5-403EB4C8D548}" presName="parentText" presStyleLbl="node1" presStyleIdx="2" presStyleCnt="4">
+    <dgm:pt modelId="{CA84908C-93B9-4876-ABB8-3CCF06B933CA}" type="pres">
+      <dgm:prSet presAssocID="{1F317792-B0F3-4650-9706-A7DB497EFCFF}" presName="parentText" presStyleLbl="node1" presStyleIdx="2" presStyleCnt="4">
         <dgm:presLayoutVars>
           <dgm:chMax val="0"/>
           <dgm:bulletEnabled val="1"/>
@@ -4368,8 +5469,8 @@
       </dgm:prSet>
       <dgm:spPr/>
     </dgm:pt>
-    <dgm:pt modelId="{F9C9BACD-869F-49D1-A816-EEE81F4E3384}" type="pres">
-      <dgm:prSet presAssocID="{56545537-4009-4AF5-84E1-087F9F5828AA}" presName="spacer" presStyleCnt="0"/>
+    <dgm:pt modelId="{A398979F-B148-46AA-9A52-0FE4E626125B}" type="pres">
+      <dgm:prSet presAssocID="{CDE0B68A-3636-44DE-9A37-B6E0792DDCEF}" presName="spacer" presStyleCnt="0"/>
       <dgm:spPr/>
     </dgm:pt>
     <dgm:pt modelId="{282A1FA1-43FF-486B-BCB3-313D7C7B7CCA}" type="pres">
@@ -4390,14 +5491,14 @@
     <dgm:cxn modelId="{FB638079-7AA3-45DC-A5AA-3D8984AC31A7}" srcId="{2E2EDDF6-6627-4900-8005-6EF5C7587AA1}" destId="{B38A4E73-71DE-4E71-9BB1-103C71524945}" srcOrd="3" destOrd="0" parTransId="{C431FC9B-32F4-445A-8D15-842CCBC8C703}" sibTransId="{75D3ED05-1A08-4F5E-93E9-29652EB4E469}"/>
     <dgm:cxn modelId="{68BC727B-620C-4F64-867C-9E01532A70B2}" type="presOf" srcId="{2E2EDDF6-6627-4900-8005-6EF5C7587AA1}" destId="{2C5D1BF4-EA79-4C2A-A296-6D693E599BAD}" srcOrd="0" destOrd="0" presId="urn:microsoft.com/office/officeart/2005/8/layout/vList2"/>
     <dgm:cxn modelId="{F4E1B386-CD2B-4F5F-BE9E-ACD916E6B2F3}" srcId="{2E2EDDF6-6627-4900-8005-6EF5C7587AA1}" destId="{0CC0FF6D-6D55-4683-AF20-F4E706F71044}" srcOrd="0" destOrd="0" parTransId="{F51EC295-73F2-4307-AFB0-A89B2DD66966}" sibTransId="{8DD9403E-97D1-46AA-977B-818EBCB77778}"/>
-    <dgm:cxn modelId="{9118DFC2-47AD-4364-8990-4E1B217AB527}" srcId="{2E2EDDF6-6627-4900-8005-6EF5C7587AA1}" destId="{4D1F7629-FB79-49B2-90E5-403EB4C8D548}" srcOrd="2" destOrd="0" parTransId="{4DF9E837-A1ED-4503-9291-5770EE270103}" sibTransId="{56545537-4009-4AF5-84E1-087F9F5828AA}"/>
-    <dgm:cxn modelId="{BC2EE6FB-F896-4FDB-AE98-72BBDFF29BC3}" type="presOf" srcId="{4D1F7629-FB79-49B2-90E5-403EB4C8D548}" destId="{EF108312-EA60-4479-8F32-20DB5371A001}" srcOrd="0" destOrd="0" presId="urn:microsoft.com/office/officeart/2005/8/layout/vList2"/>
+    <dgm:cxn modelId="{E16710AB-764C-40C1-9231-BA966D4D85E7}" type="presOf" srcId="{1F317792-B0F3-4650-9706-A7DB497EFCFF}" destId="{CA84908C-93B9-4876-ABB8-3CCF06B933CA}" srcOrd="0" destOrd="0" presId="urn:microsoft.com/office/officeart/2005/8/layout/vList2"/>
+    <dgm:cxn modelId="{428E5DDE-912A-44AB-B8C0-F7DFB7CB7A1E}" srcId="{2E2EDDF6-6627-4900-8005-6EF5C7587AA1}" destId="{1F317792-B0F3-4650-9706-A7DB497EFCFF}" srcOrd="2" destOrd="0" parTransId="{7E85A898-182A-4765-8977-B0121EEB2E69}" sibTransId="{CDE0B68A-3636-44DE-9A37-B6E0792DDCEF}"/>
     <dgm:cxn modelId="{184FD061-9397-42E2-BC13-31C0F3235BC6}" type="presParOf" srcId="{2C5D1BF4-EA79-4C2A-A296-6D693E599BAD}" destId="{21F8DA4C-D3E7-433A-97CB-91707A86CC75}" srcOrd="0" destOrd="0" presId="urn:microsoft.com/office/officeart/2005/8/layout/vList2"/>
     <dgm:cxn modelId="{E58F513E-5217-40C3-BB97-D4B09F9037E9}" type="presParOf" srcId="{2C5D1BF4-EA79-4C2A-A296-6D693E599BAD}" destId="{B932303A-C417-404E-A846-F03DF2F30128}" srcOrd="1" destOrd="0" presId="urn:microsoft.com/office/officeart/2005/8/layout/vList2"/>
     <dgm:cxn modelId="{48E5D287-5F3F-429B-9FFE-6A84B276F67A}" type="presParOf" srcId="{2C5D1BF4-EA79-4C2A-A296-6D693E599BAD}" destId="{A6225F51-1ACB-4176-BC45-5FDA099CF372}" srcOrd="2" destOrd="0" presId="urn:microsoft.com/office/officeart/2005/8/layout/vList2"/>
     <dgm:cxn modelId="{8A4D1CF2-0AE8-4AE9-8C27-4616CB5C771C}" type="presParOf" srcId="{2C5D1BF4-EA79-4C2A-A296-6D693E599BAD}" destId="{8913738D-58BB-4BDB-BC5C-D0482FA585CD}" srcOrd="3" destOrd="0" presId="urn:microsoft.com/office/officeart/2005/8/layout/vList2"/>
-    <dgm:cxn modelId="{7C89773E-8717-4B36-92FA-7B11F7475EFC}" type="presParOf" srcId="{2C5D1BF4-EA79-4C2A-A296-6D693E599BAD}" destId="{EF108312-EA60-4479-8F32-20DB5371A001}" srcOrd="4" destOrd="0" presId="urn:microsoft.com/office/officeart/2005/8/layout/vList2"/>
-    <dgm:cxn modelId="{C9929C96-8887-4BC9-BF48-C58B3BC90AD9}" type="presParOf" srcId="{2C5D1BF4-EA79-4C2A-A296-6D693E599BAD}" destId="{F9C9BACD-869F-49D1-A816-EEE81F4E3384}" srcOrd="5" destOrd="0" presId="urn:microsoft.com/office/officeart/2005/8/layout/vList2"/>
+    <dgm:cxn modelId="{C06A73B6-28C0-44DF-9685-14E99E51B91A}" type="presParOf" srcId="{2C5D1BF4-EA79-4C2A-A296-6D693E599BAD}" destId="{CA84908C-93B9-4876-ABB8-3CCF06B933CA}" srcOrd="4" destOrd="0" presId="urn:microsoft.com/office/officeart/2005/8/layout/vList2"/>
+    <dgm:cxn modelId="{316175CC-6C1C-4641-BA62-65BFF7DD7FBC}" type="presParOf" srcId="{2C5D1BF4-EA79-4C2A-A296-6D693E599BAD}" destId="{A398979F-B148-46AA-9A52-0FE4E626125B}" srcOrd="5" destOrd="0" presId="urn:microsoft.com/office/officeart/2005/8/layout/vList2"/>
     <dgm:cxn modelId="{77574781-7344-4B0F-B61A-9EC1A617AA8D}" type="presParOf" srcId="{2C5D1BF4-EA79-4C2A-A296-6D693E599BAD}" destId="{282A1FA1-43FF-486B-BCB3-313D7C7B7CCA}" srcOrd="6" destOrd="0" presId="urn:microsoft.com/office/officeart/2005/8/layout/vList2"/>
   </dgm:cxnLst>
   <dgm:bg/>
@@ -4410,7 +5511,7 @@
 </dgm:dataModel>
 </file>
 
-<file path=ppt/diagrams/data4.xml><?xml version="1.0" encoding="utf-8"?>
+<file path=ppt/diagrams/data5.xml><?xml version="1.0" encoding="utf-8"?>
 <dgm:dataModel xmlns:dgm="http://schemas.openxmlformats.org/drawingml/2006/diagram" xmlns:a="http://schemas.openxmlformats.org/drawingml/2006/main">
   <dgm:ptLst>
     <dgm:pt modelId="{82755953-51AF-4801-8622-608B03532348}" type="doc">
@@ -4861,6 +5962,492 @@
 </file>
 
 <file path=ppt/diagrams/drawing2.xml><?xml version="1.0" encoding="utf-8"?>
+<dsp:drawing xmlns:dgm="http://schemas.openxmlformats.org/drawingml/2006/diagram" xmlns:dsp="http://schemas.microsoft.com/office/drawing/2008/diagram" xmlns:a="http://schemas.openxmlformats.org/drawingml/2006/main">
+  <dsp:spTree>
+    <dsp:nvGrpSpPr>
+      <dsp:cNvPr id="0" name=""/>
+      <dsp:cNvGrpSpPr/>
+    </dsp:nvGrpSpPr>
+    <dsp:grpSpPr/>
+    <dsp:sp modelId="{3C4C43DE-ECFF-4362-B675-3AFE4C390960}">
+      <dsp:nvSpPr>
+        <dsp:cNvPr id="0" name=""/>
+        <dsp:cNvSpPr/>
+      </dsp:nvSpPr>
+      <dsp:spPr>
+        <a:xfrm rot="5400000">
+          <a:off x="2813948" y="-954260"/>
+          <a:ext cx="944715" cy="3092993"/>
+        </a:xfrm>
+        <a:prstGeom prst="round2SameRect">
+          <a:avLst/>
+        </a:prstGeom>
+        <a:solidFill>
+          <a:schemeClr val="accent1">
+            <a:alpha val="90000"/>
+            <a:tint val="40000"/>
+            <a:hueOff val="0"/>
+            <a:satOff val="0"/>
+            <a:lumOff val="0"/>
+            <a:alphaOff val="0"/>
+          </a:schemeClr>
+        </a:solidFill>
+        <a:ln w="19050" cap="flat" cmpd="sng" algn="ctr">
+          <a:solidFill>
+            <a:schemeClr val="accent1">
+              <a:alpha val="90000"/>
+              <a:tint val="40000"/>
+              <a:hueOff val="0"/>
+              <a:satOff val="0"/>
+              <a:lumOff val="0"/>
+              <a:alphaOff val="0"/>
+            </a:schemeClr>
+          </a:solidFill>
+          <a:prstDash val="solid"/>
+          <a:miter lim="800000"/>
+        </a:ln>
+        <a:effectLst/>
+      </dsp:spPr>
+      <dsp:style>
+        <a:lnRef idx="2">
+          <a:scrgbClr r="0" g="0" b="0"/>
+        </a:lnRef>
+        <a:fillRef idx="1">
+          <a:scrgbClr r="0" g="0" b="0"/>
+        </a:fillRef>
+        <a:effectRef idx="0">
+          <a:scrgbClr r="0" g="0" b="0"/>
+        </a:effectRef>
+        <a:fontRef idx="minor"/>
+      </dsp:style>
+      <dsp:txBody>
+        <a:bodyPr spcFirstLastPara="0" vert="horz" wrap="square" lIns="179070" tIns="89535" rIns="179070" bIns="89535" numCol="1" spcCol="1270" anchor="ctr" anchorCtr="0">
+          <a:noAutofit/>
+        </a:bodyPr>
+        <a:lstStyle/>
+        <a:p>
+          <a:pPr marL="285750" lvl="1" indent="-285750" algn="l" defTabSz="2089150">
+            <a:lnSpc>
+              <a:spcPct val="90000"/>
+            </a:lnSpc>
+            <a:spcBef>
+              <a:spcPct val="0"/>
+            </a:spcBef>
+            <a:spcAft>
+              <a:spcPct val="15000"/>
+            </a:spcAft>
+            <a:buChar char="•"/>
+          </a:pPr>
+          <a:r>
+            <a:rPr lang="en-US" sz="4700" kern="1200"/>
+            <a:t>.xlsx</a:t>
+          </a:r>
+        </a:p>
+      </dsp:txBody>
+      <dsp:txXfrm rot="-5400000">
+        <a:off x="1739810" y="165995"/>
+        <a:ext cx="3046876" cy="852481"/>
+      </dsp:txXfrm>
+    </dsp:sp>
+    <dsp:sp modelId="{EBA3E521-014B-4F1A-A66B-54866EFB3CE7}">
+      <dsp:nvSpPr>
+        <dsp:cNvPr id="0" name=""/>
+        <dsp:cNvSpPr/>
+      </dsp:nvSpPr>
+      <dsp:spPr>
+        <a:xfrm>
+          <a:off x="0" y="1789"/>
+          <a:ext cx="1739809" cy="1180894"/>
+        </a:xfrm>
+        <a:prstGeom prst="roundRect">
+          <a:avLst/>
+        </a:prstGeom>
+        <a:solidFill>
+          <a:schemeClr val="accent1">
+            <a:hueOff val="0"/>
+            <a:satOff val="0"/>
+            <a:lumOff val="0"/>
+            <a:alphaOff val="0"/>
+          </a:schemeClr>
+        </a:solidFill>
+        <a:ln w="19050" cap="flat" cmpd="sng" algn="ctr">
+          <a:solidFill>
+            <a:schemeClr val="lt1">
+              <a:hueOff val="0"/>
+              <a:satOff val="0"/>
+              <a:lumOff val="0"/>
+              <a:alphaOff val="0"/>
+            </a:schemeClr>
+          </a:solidFill>
+          <a:prstDash val="solid"/>
+          <a:miter lim="800000"/>
+        </a:ln>
+        <a:effectLst/>
+      </dsp:spPr>
+      <dsp:style>
+        <a:lnRef idx="2">
+          <a:scrgbClr r="0" g="0" b="0"/>
+        </a:lnRef>
+        <a:fillRef idx="1">
+          <a:scrgbClr r="0" g="0" b="0"/>
+        </a:fillRef>
+        <a:effectRef idx="0">
+          <a:scrgbClr r="0" g="0" b="0"/>
+        </a:effectRef>
+        <a:fontRef idx="minor">
+          <a:schemeClr val="lt1"/>
+        </a:fontRef>
+      </dsp:style>
+      <dsp:txBody>
+        <a:bodyPr spcFirstLastPara="0" vert="horz" wrap="square" lIns="64770" tIns="32385" rIns="64770" bIns="32385" numCol="1" spcCol="1270" anchor="ctr" anchorCtr="0">
+          <a:noAutofit/>
+        </a:bodyPr>
+        <a:lstStyle/>
+        <a:p>
+          <a:pPr marL="0" lvl="0" indent="0" algn="ctr" defTabSz="755650">
+            <a:lnSpc>
+              <a:spcPct val="90000"/>
+            </a:lnSpc>
+            <a:spcBef>
+              <a:spcPct val="0"/>
+            </a:spcBef>
+            <a:spcAft>
+              <a:spcPct val="35000"/>
+            </a:spcAft>
+            <a:buNone/>
+          </a:pPr>
+          <a:r>
+            <a:rPr lang="en-US" sz="1700" kern="1200"/>
+            <a:t>Task 1 Output  </a:t>
+          </a:r>
+        </a:p>
+      </dsp:txBody>
+      <dsp:txXfrm>
+        <a:off x="57646" y="59435"/>
+        <a:ext cx="1624517" cy="1065602"/>
+      </dsp:txXfrm>
+    </dsp:sp>
+    <dsp:sp modelId="{A14B41F0-A410-4707-A56D-9689EF7C496D}">
+      <dsp:nvSpPr>
+        <dsp:cNvPr id="0" name=""/>
+        <dsp:cNvSpPr/>
+      </dsp:nvSpPr>
+      <dsp:spPr>
+        <a:xfrm rot="5400000">
+          <a:off x="2813948" y="285678"/>
+          <a:ext cx="944715" cy="3092993"/>
+        </a:xfrm>
+        <a:prstGeom prst="round2SameRect">
+          <a:avLst/>
+        </a:prstGeom>
+        <a:solidFill>
+          <a:schemeClr val="accent1">
+            <a:alpha val="90000"/>
+            <a:tint val="40000"/>
+            <a:hueOff val="0"/>
+            <a:satOff val="0"/>
+            <a:lumOff val="0"/>
+            <a:alphaOff val="0"/>
+          </a:schemeClr>
+        </a:solidFill>
+        <a:ln w="19050" cap="flat" cmpd="sng" algn="ctr">
+          <a:solidFill>
+            <a:schemeClr val="accent1">
+              <a:alpha val="90000"/>
+              <a:tint val="40000"/>
+              <a:hueOff val="0"/>
+              <a:satOff val="0"/>
+              <a:lumOff val="0"/>
+              <a:alphaOff val="0"/>
+            </a:schemeClr>
+          </a:solidFill>
+          <a:prstDash val="solid"/>
+          <a:miter lim="800000"/>
+        </a:ln>
+        <a:effectLst/>
+      </dsp:spPr>
+      <dsp:style>
+        <a:lnRef idx="2">
+          <a:scrgbClr r="0" g="0" b="0"/>
+        </a:lnRef>
+        <a:fillRef idx="1">
+          <a:scrgbClr r="0" g="0" b="0"/>
+        </a:fillRef>
+        <a:effectRef idx="0">
+          <a:scrgbClr r="0" g="0" b="0"/>
+        </a:effectRef>
+        <a:fontRef idx="minor"/>
+      </dsp:style>
+      <dsp:txBody>
+        <a:bodyPr spcFirstLastPara="0" vert="horz" wrap="square" lIns="179070" tIns="89535" rIns="179070" bIns="89535" numCol="1" spcCol="1270" anchor="ctr" anchorCtr="0">
+          <a:noAutofit/>
+        </a:bodyPr>
+        <a:lstStyle/>
+        <a:p>
+          <a:pPr marL="285750" lvl="1" indent="-285750" algn="l" defTabSz="2089150">
+            <a:lnSpc>
+              <a:spcPct val="90000"/>
+            </a:lnSpc>
+            <a:spcBef>
+              <a:spcPct val="0"/>
+            </a:spcBef>
+            <a:spcAft>
+              <a:spcPct val="15000"/>
+            </a:spcAft>
+            <a:buChar char="•"/>
+          </a:pPr>
+          <a:r>
+            <a:rPr lang="en-US" sz="4700" kern="1200"/>
+            <a:t>.json</a:t>
+          </a:r>
+        </a:p>
+      </dsp:txBody>
+      <dsp:txXfrm rot="-5400000">
+        <a:off x="1739810" y="1405934"/>
+        <a:ext cx="3046876" cy="852481"/>
+      </dsp:txXfrm>
+    </dsp:sp>
+    <dsp:sp modelId="{09781AA9-04FB-4801-A2A2-915D02037DD9}">
+      <dsp:nvSpPr>
+        <dsp:cNvPr id="0" name=""/>
+        <dsp:cNvSpPr/>
+      </dsp:nvSpPr>
+      <dsp:spPr>
+        <a:xfrm>
+          <a:off x="0" y="1241728"/>
+          <a:ext cx="1739809" cy="1180894"/>
+        </a:xfrm>
+        <a:prstGeom prst="roundRect">
+          <a:avLst/>
+        </a:prstGeom>
+        <a:solidFill>
+          <a:schemeClr val="accent1">
+            <a:hueOff val="0"/>
+            <a:satOff val="0"/>
+            <a:lumOff val="0"/>
+            <a:alphaOff val="0"/>
+          </a:schemeClr>
+        </a:solidFill>
+        <a:ln w="19050" cap="flat" cmpd="sng" algn="ctr">
+          <a:solidFill>
+            <a:schemeClr val="lt1">
+              <a:hueOff val="0"/>
+              <a:satOff val="0"/>
+              <a:lumOff val="0"/>
+              <a:alphaOff val="0"/>
+            </a:schemeClr>
+          </a:solidFill>
+          <a:prstDash val="solid"/>
+          <a:miter lim="800000"/>
+        </a:ln>
+        <a:effectLst/>
+      </dsp:spPr>
+      <dsp:style>
+        <a:lnRef idx="2">
+          <a:scrgbClr r="0" g="0" b="0"/>
+        </a:lnRef>
+        <a:fillRef idx="1">
+          <a:scrgbClr r="0" g="0" b="0"/>
+        </a:fillRef>
+        <a:effectRef idx="0">
+          <a:scrgbClr r="0" g="0" b="0"/>
+        </a:effectRef>
+        <a:fontRef idx="minor">
+          <a:schemeClr val="lt1"/>
+        </a:fontRef>
+      </dsp:style>
+      <dsp:txBody>
+        <a:bodyPr spcFirstLastPara="0" vert="horz" wrap="square" lIns="64770" tIns="32385" rIns="64770" bIns="32385" numCol="1" spcCol="1270" anchor="ctr" anchorCtr="0">
+          <a:noAutofit/>
+        </a:bodyPr>
+        <a:lstStyle/>
+        <a:p>
+          <a:pPr marL="0" lvl="0" indent="0" algn="ctr" defTabSz="755650">
+            <a:lnSpc>
+              <a:spcPct val="90000"/>
+            </a:lnSpc>
+            <a:spcBef>
+              <a:spcPct val="0"/>
+            </a:spcBef>
+            <a:spcAft>
+              <a:spcPct val="35000"/>
+            </a:spcAft>
+            <a:buNone/>
+          </a:pPr>
+          <a:r>
+            <a:rPr lang="en-US" sz="1700" kern="1200"/>
+            <a:t>Auxiliary Metadata</a:t>
+          </a:r>
+        </a:p>
+      </dsp:txBody>
+      <dsp:txXfrm>
+        <a:off x="57646" y="1299374"/>
+        <a:ext cx="1624517" cy="1065602"/>
+      </dsp:txXfrm>
+    </dsp:sp>
+    <dsp:sp modelId="{BFBB616B-9497-4B97-9ED2-CD5E9DC8D57B}">
+      <dsp:nvSpPr>
+        <dsp:cNvPr id="0" name=""/>
+        <dsp:cNvSpPr/>
+      </dsp:nvSpPr>
+      <dsp:spPr>
+        <a:xfrm rot="5400000">
+          <a:off x="2813948" y="1525617"/>
+          <a:ext cx="944715" cy="3092993"/>
+        </a:xfrm>
+        <a:prstGeom prst="round2SameRect">
+          <a:avLst/>
+        </a:prstGeom>
+        <a:solidFill>
+          <a:schemeClr val="accent1">
+            <a:alpha val="90000"/>
+            <a:tint val="40000"/>
+            <a:hueOff val="0"/>
+            <a:satOff val="0"/>
+            <a:lumOff val="0"/>
+            <a:alphaOff val="0"/>
+          </a:schemeClr>
+        </a:solidFill>
+        <a:ln w="19050" cap="flat" cmpd="sng" algn="ctr">
+          <a:solidFill>
+            <a:schemeClr val="accent1">
+              <a:alpha val="90000"/>
+              <a:tint val="40000"/>
+              <a:hueOff val="0"/>
+              <a:satOff val="0"/>
+              <a:lumOff val="0"/>
+              <a:alphaOff val="0"/>
+            </a:schemeClr>
+          </a:solidFill>
+          <a:prstDash val="solid"/>
+          <a:miter lim="800000"/>
+        </a:ln>
+        <a:effectLst/>
+      </dsp:spPr>
+      <dsp:style>
+        <a:lnRef idx="2">
+          <a:scrgbClr r="0" g="0" b="0"/>
+        </a:lnRef>
+        <a:fillRef idx="1">
+          <a:scrgbClr r="0" g="0" b="0"/>
+        </a:fillRef>
+        <a:effectRef idx="0">
+          <a:scrgbClr r="0" g="0" b="0"/>
+        </a:effectRef>
+        <a:fontRef idx="minor"/>
+      </dsp:style>
+      <dsp:txBody>
+        <a:bodyPr spcFirstLastPara="0" vert="horz" wrap="square" lIns="179070" tIns="89535" rIns="179070" bIns="89535" numCol="1" spcCol="1270" anchor="ctr" anchorCtr="0">
+          <a:noAutofit/>
+        </a:bodyPr>
+        <a:lstStyle/>
+        <a:p>
+          <a:pPr marL="285750" lvl="1" indent="-285750" algn="l" defTabSz="2089150">
+            <a:lnSpc>
+              <a:spcPct val="90000"/>
+            </a:lnSpc>
+            <a:spcBef>
+              <a:spcPct val="0"/>
+            </a:spcBef>
+            <a:spcAft>
+              <a:spcPct val="15000"/>
+            </a:spcAft>
+            <a:buChar char="•"/>
+          </a:pPr>
+          <a:r>
+            <a:rPr lang="en-US" sz="4700" kern="1200" dirty="0"/>
+            <a:t>.txt </a:t>
+          </a:r>
+        </a:p>
+      </dsp:txBody>
+      <dsp:txXfrm rot="-5400000">
+        <a:off x="1739810" y="2645873"/>
+        <a:ext cx="3046876" cy="852481"/>
+      </dsp:txXfrm>
+    </dsp:sp>
+    <dsp:sp modelId="{5573F7DA-646D-4491-A0DC-1FDAF92E2CE3}">
+      <dsp:nvSpPr>
+        <dsp:cNvPr id="0" name=""/>
+        <dsp:cNvSpPr/>
+      </dsp:nvSpPr>
+      <dsp:spPr>
+        <a:xfrm>
+          <a:off x="0" y="2481667"/>
+          <a:ext cx="1739809" cy="1180894"/>
+        </a:xfrm>
+        <a:prstGeom prst="roundRect">
+          <a:avLst/>
+        </a:prstGeom>
+        <a:solidFill>
+          <a:schemeClr val="accent1">
+            <a:hueOff val="0"/>
+            <a:satOff val="0"/>
+            <a:lumOff val="0"/>
+            <a:alphaOff val="0"/>
+          </a:schemeClr>
+        </a:solidFill>
+        <a:ln w="19050" cap="flat" cmpd="sng" algn="ctr">
+          <a:solidFill>
+            <a:schemeClr val="lt1">
+              <a:hueOff val="0"/>
+              <a:satOff val="0"/>
+              <a:lumOff val="0"/>
+              <a:alphaOff val="0"/>
+            </a:schemeClr>
+          </a:solidFill>
+          <a:prstDash val="solid"/>
+          <a:miter lim="800000"/>
+        </a:ln>
+        <a:effectLst/>
+      </dsp:spPr>
+      <dsp:style>
+        <a:lnRef idx="2">
+          <a:scrgbClr r="0" g="0" b="0"/>
+        </a:lnRef>
+        <a:fillRef idx="1">
+          <a:scrgbClr r="0" g="0" b="0"/>
+        </a:fillRef>
+        <a:effectRef idx="0">
+          <a:scrgbClr r="0" g="0" b="0"/>
+        </a:effectRef>
+        <a:fontRef idx="minor">
+          <a:schemeClr val="lt1"/>
+        </a:fontRef>
+      </dsp:style>
+      <dsp:txBody>
+        <a:bodyPr spcFirstLastPara="0" vert="horz" wrap="square" lIns="64770" tIns="32385" rIns="64770" bIns="32385" numCol="1" spcCol="1270" anchor="ctr" anchorCtr="0">
+          <a:noAutofit/>
+        </a:bodyPr>
+        <a:lstStyle/>
+        <a:p>
+          <a:pPr marL="0" lvl="0" indent="0" algn="ctr" defTabSz="755650">
+            <a:lnSpc>
+              <a:spcPct val="90000"/>
+            </a:lnSpc>
+            <a:spcBef>
+              <a:spcPct val="0"/>
+            </a:spcBef>
+            <a:spcAft>
+              <a:spcPct val="35000"/>
+            </a:spcAft>
+            <a:buNone/>
+          </a:pPr>
+          <a:r>
+            <a:rPr lang="en-US" sz="1700" kern="1200"/>
+            <a:t>Task 2 Output : Count Vectoriser and Vocab List</a:t>
+          </a:r>
+        </a:p>
+      </dsp:txBody>
+      <dsp:txXfrm>
+        <a:off x="57646" y="2539313"/>
+        <a:ext cx="1624517" cy="1065602"/>
+      </dsp:txXfrm>
+    </dsp:sp>
+  </dsp:spTree>
+</dsp:drawing>
+</file>
+
+<file path=ppt/diagrams/drawing3.xml><?xml version="1.0" encoding="utf-8"?>
 <dsp:drawing xmlns:dgm="http://schemas.openxmlformats.org/drawingml/2006/diagram" xmlns:dsp="http://schemas.microsoft.com/office/drawing/2008/diagram" xmlns:a="http://schemas.openxmlformats.org/drawingml/2006/main">
   <dsp:spTree>
     <dsp:nvGrpSpPr>
@@ -5508,7 +7095,7 @@
 </dsp:drawing>
 </file>
 
-<file path=ppt/diagrams/drawing3.xml><?xml version="1.0" encoding="utf-8"?>
+<file path=ppt/diagrams/drawing4.xml><?xml version="1.0" encoding="utf-8"?>
 <dsp:drawing xmlns:dgm="http://schemas.openxmlformats.org/drawingml/2006/diagram" xmlns:dsp="http://schemas.microsoft.com/office/drawing/2008/diagram" xmlns:a="http://schemas.openxmlformats.org/drawingml/2006/main">
   <dsp:spTree>
     <dsp:nvGrpSpPr>
@@ -5523,8 +7110,8 @@
       </dsp:nvSpPr>
       <dsp:spPr>
         <a:xfrm>
-          <a:off x="0" y="54331"/>
-          <a:ext cx="6666833" cy="1286634"/>
+          <a:off x="0" y="170532"/>
+          <a:ext cx="6666833" cy="1230693"/>
         </a:xfrm>
         <a:prstGeom prst="roundRect">
           <a:avLst/>
@@ -5587,12 +7174,12 @@
         </a:fontRef>
       </dsp:style>
       <dsp:txBody>
-        <a:bodyPr spcFirstLastPara="0" vert="horz" wrap="square" lIns="87630" tIns="87630" rIns="87630" bIns="87630" numCol="1" spcCol="1270" anchor="ctr" anchorCtr="0">
+        <a:bodyPr spcFirstLastPara="0" vert="horz" wrap="square" lIns="83820" tIns="83820" rIns="83820" bIns="83820" numCol="1" spcCol="1270" anchor="ctr" anchorCtr="0">
           <a:noAutofit/>
         </a:bodyPr>
         <a:lstStyle/>
         <a:p>
-          <a:pPr marL="0" lvl="0" indent="0" algn="l" defTabSz="1022350">
+          <a:pPr marL="0" lvl="0" indent="0" algn="l" defTabSz="977900">
             <a:lnSpc>
               <a:spcPct val="90000"/>
             </a:lnSpc>
@@ -5605,14 +7192,14 @@
             <a:buNone/>
           </a:pPr>
           <a:r>
-            <a:rPr lang="en-US" sz="2300" kern="1200"/>
+            <a:rPr lang="en-US" sz="2200" kern="1200"/>
             <a:t>Veterinarian and automobile are two industries that are worth exploring </a:t>
           </a:r>
         </a:p>
       </dsp:txBody>
       <dsp:txXfrm>
-        <a:off x="62808" y="117139"/>
-        <a:ext cx="6541217" cy="1161018"/>
+        <a:off x="60077" y="230609"/>
+        <a:ext cx="6546679" cy="1110539"/>
       </dsp:txXfrm>
     </dsp:sp>
     <dsp:sp modelId="{A6225F51-1ACB-4176-BC45-5FDA099CF372}">
@@ -5622,8 +7209,8 @@
       </dsp:nvSpPr>
       <dsp:spPr>
         <a:xfrm>
-          <a:off x="0" y="1407205"/>
-          <a:ext cx="6666833" cy="1286634"/>
+          <a:off x="0" y="1464586"/>
+          <a:ext cx="6666833" cy="1230693"/>
         </a:xfrm>
         <a:prstGeom prst="roundRect">
           <a:avLst/>
@@ -5686,12 +7273,12 @@
         </a:fontRef>
       </dsp:style>
       <dsp:txBody>
-        <a:bodyPr spcFirstLastPara="0" vert="horz" wrap="square" lIns="87630" tIns="87630" rIns="87630" bIns="87630" numCol="1" spcCol="1270" anchor="ctr" anchorCtr="0">
+        <a:bodyPr spcFirstLastPara="0" vert="horz" wrap="square" lIns="83820" tIns="83820" rIns="83820" bIns="83820" numCol="1" spcCol="1270" anchor="ctr" anchorCtr="0">
           <a:noAutofit/>
         </a:bodyPr>
         <a:lstStyle/>
         <a:p>
-          <a:pPr marL="0" lvl="0" indent="0" algn="l" defTabSz="1022350">
+          <a:pPr marL="0" lvl="0" indent="0" algn="l" defTabSz="977900">
             <a:lnSpc>
               <a:spcPct val="90000"/>
             </a:lnSpc>
@@ -5704,25 +7291,25 @@
             <a:buNone/>
           </a:pPr>
           <a:r>
-            <a:rPr lang="en-US" sz="2300" kern="1200"/>
-            <a:t>Aim to offer services which offer high return/value for customers, rather than catering towards luxury services that most people cannot afford</a:t>
+            <a:rPr lang="en-US" sz="2200" kern="1200" dirty="0"/>
+            <a:t>Aim to provide services which offer high return/value for customers, rather than catering towards luxury services that most people cannot afford</a:t>
           </a:r>
         </a:p>
       </dsp:txBody>
       <dsp:txXfrm>
-        <a:off x="62808" y="1470013"/>
-        <a:ext cx="6541217" cy="1161018"/>
+        <a:off x="60077" y="1524663"/>
+        <a:ext cx="6546679" cy="1110539"/>
       </dsp:txXfrm>
     </dsp:sp>
-    <dsp:sp modelId="{EF108312-EA60-4479-8F32-20DB5371A001}">
+    <dsp:sp modelId="{CA84908C-93B9-4876-ABB8-3CCF06B933CA}">
       <dsp:nvSpPr>
         <dsp:cNvPr id="0" name=""/>
         <dsp:cNvSpPr/>
       </dsp:nvSpPr>
       <dsp:spPr>
         <a:xfrm>
-          <a:off x="0" y="2760080"/>
-          <a:ext cx="6666833" cy="1286634"/>
+          <a:off x="0" y="2758639"/>
+          <a:ext cx="6666833" cy="1230693"/>
         </a:xfrm>
         <a:prstGeom prst="roundRect">
           <a:avLst/>
@@ -5785,12 +7372,12 @@
         </a:fontRef>
       </dsp:style>
       <dsp:txBody>
-        <a:bodyPr spcFirstLastPara="0" vert="horz" wrap="square" lIns="87630" tIns="87630" rIns="87630" bIns="87630" numCol="1" spcCol="1270" anchor="ctr" anchorCtr="0">
+        <a:bodyPr spcFirstLastPara="0" vert="horz" wrap="square" lIns="83820" tIns="83820" rIns="83820" bIns="83820" numCol="1" spcCol="1270" anchor="ctr" anchorCtr="0">
           <a:noAutofit/>
         </a:bodyPr>
         <a:lstStyle/>
         <a:p>
-          <a:pPr marL="0" lvl="0" indent="0" algn="l" defTabSz="1022350">
+          <a:pPr marL="0" lvl="0" indent="0" algn="l" defTabSz="977900">
             <a:lnSpc>
               <a:spcPct val="90000"/>
             </a:lnSpc>
@@ -5803,14 +7390,15 @@
             <a:buNone/>
           </a:pPr>
           <a:r>
-            <a:rPr lang="en-US" sz="2300" kern="1200"/>
-            <a:t>No need to concern too much with locating in CBD</a:t>
+            <a:rPr lang="en-US" sz="2200" kern="1200"/>
+            <a:t>Ensure business follows strict health regulations and protocols, as well as offer inclusive accessibility option </a:t>
           </a:r>
+          <a:endParaRPr lang="en-AU" sz="2200" kern="1200"/>
         </a:p>
       </dsp:txBody>
       <dsp:txXfrm>
-        <a:off x="62808" y="2822888"/>
-        <a:ext cx="6541217" cy="1161018"/>
+        <a:off x="60077" y="2818716"/>
+        <a:ext cx="6546679" cy="1110539"/>
       </dsp:txXfrm>
     </dsp:sp>
     <dsp:sp modelId="{282A1FA1-43FF-486B-BCB3-313D7C7B7CCA}">
@@ -5820,8 +7408,8 @@
       </dsp:nvSpPr>
       <dsp:spPr>
         <a:xfrm>
-          <a:off x="0" y="4112954"/>
-          <a:ext cx="6666833" cy="1286634"/>
+          <a:off x="0" y="4052693"/>
+          <a:ext cx="6666833" cy="1230693"/>
         </a:xfrm>
         <a:prstGeom prst="roundRect">
           <a:avLst/>
@@ -5884,12 +7472,12 @@
         </a:fontRef>
       </dsp:style>
       <dsp:txBody>
-        <a:bodyPr spcFirstLastPara="0" vert="horz" wrap="square" lIns="87630" tIns="87630" rIns="87630" bIns="87630" numCol="1" spcCol="1270" anchor="ctr" anchorCtr="0">
+        <a:bodyPr spcFirstLastPara="0" vert="horz" wrap="square" lIns="83820" tIns="83820" rIns="83820" bIns="83820" numCol="1" spcCol="1270" anchor="ctr" anchorCtr="0">
           <a:noAutofit/>
         </a:bodyPr>
         <a:lstStyle/>
         <a:p>
-          <a:pPr marL="0" lvl="0" indent="0" algn="l" defTabSz="1022350">
+          <a:pPr marL="0" lvl="0" indent="0" algn="l" defTabSz="977900">
             <a:lnSpc>
               <a:spcPct val="90000"/>
             </a:lnSpc>
@@ -5902,21 +7490,21 @@
             <a:buNone/>
           </a:pPr>
           <a:r>
-            <a:rPr lang="en-US" sz="2300" kern="1200"/>
-            <a:t>Ensure business follows strict health regulations and protocols, as well as offer inclusive accessibility option </a:t>
+            <a:rPr lang="en-US" sz="2200" kern="1200" dirty="0"/>
+            <a:t>No need to concern too much with locating in CBD</a:t>
           </a:r>
         </a:p>
       </dsp:txBody>
       <dsp:txXfrm>
-        <a:off x="62808" y="4175762"/>
-        <a:ext cx="6541217" cy="1161018"/>
+        <a:off x="60077" y="4112770"/>
+        <a:ext cx="6546679" cy="1110539"/>
       </dsp:txXfrm>
     </dsp:sp>
   </dsp:spTree>
 </dsp:drawing>
 </file>
 
-<file path=ppt/diagrams/drawing4.xml><?xml version="1.0" encoding="utf-8"?>
+<file path=ppt/diagrams/drawing5.xml><?xml version="1.0" encoding="utf-8"?>
 <dsp:drawing xmlns:dgm="http://schemas.openxmlformats.org/drawingml/2006/diagram" xmlns:dsp="http://schemas.microsoft.com/office/drawing/2008/diagram" xmlns:a="http://schemas.openxmlformats.org/drawingml/2006/main">
   <dsp:spTree>
     <dsp:nvGrpSpPr>
@@ -6339,6 +7927,239 @@
 </file>
 
 <file path=ppt/diagrams/layout2.xml><?xml version="1.0" encoding="utf-8"?>
+<dgm:layoutDef xmlns:dgm="http://schemas.openxmlformats.org/drawingml/2006/diagram" xmlns:a="http://schemas.openxmlformats.org/drawingml/2006/main" uniqueId="urn:microsoft.com/office/officeart/2005/8/layout/vList5">
+  <dgm:title val=""/>
+  <dgm:desc val=""/>
+  <dgm:catLst>
+    <dgm:cat type="list" pri="15000"/>
+    <dgm:cat type="convert" pri="2000"/>
+  </dgm:catLst>
+  <dgm:sampData>
+    <dgm:dataModel>
+      <dgm:ptLst>
+        <dgm:pt modelId="0" type="doc"/>
+        <dgm:pt modelId="1">
+          <dgm:prSet phldr="1"/>
+        </dgm:pt>
+        <dgm:pt modelId="11">
+          <dgm:prSet phldr="1"/>
+        </dgm:pt>
+        <dgm:pt modelId="12">
+          <dgm:prSet phldr="1"/>
+        </dgm:pt>
+        <dgm:pt modelId="2">
+          <dgm:prSet phldr="1"/>
+        </dgm:pt>
+        <dgm:pt modelId="21">
+          <dgm:prSet phldr="1"/>
+        </dgm:pt>
+        <dgm:pt modelId="22">
+          <dgm:prSet phldr="1"/>
+        </dgm:pt>
+        <dgm:pt modelId="3">
+          <dgm:prSet phldr="1"/>
+        </dgm:pt>
+        <dgm:pt modelId="31">
+          <dgm:prSet phldr="1"/>
+        </dgm:pt>
+        <dgm:pt modelId="32">
+          <dgm:prSet phldr="1"/>
+        </dgm:pt>
+      </dgm:ptLst>
+      <dgm:cxnLst>
+        <dgm:cxn modelId="4" srcId="0" destId="1" srcOrd="0" destOrd="0"/>
+        <dgm:cxn modelId="5" srcId="0" destId="2" srcOrd="1" destOrd="0"/>
+        <dgm:cxn modelId="6" srcId="0" destId="3" srcOrd="2" destOrd="0"/>
+        <dgm:cxn modelId="13" srcId="1" destId="11" srcOrd="0" destOrd="0"/>
+        <dgm:cxn modelId="14" srcId="1" destId="12" srcOrd="1" destOrd="0"/>
+        <dgm:cxn modelId="23" srcId="2" destId="21" srcOrd="0" destOrd="0"/>
+        <dgm:cxn modelId="24" srcId="2" destId="22" srcOrd="1" destOrd="0"/>
+        <dgm:cxn modelId="33" srcId="3" destId="31" srcOrd="0" destOrd="0"/>
+        <dgm:cxn modelId="34" srcId="3" destId="32" srcOrd="1" destOrd="0"/>
+      </dgm:cxnLst>
+      <dgm:bg/>
+      <dgm:whole/>
+    </dgm:dataModel>
+  </dgm:sampData>
+  <dgm:styleData>
+    <dgm:dataModel>
+      <dgm:ptLst>
+        <dgm:pt modelId="0" type="doc"/>
+        <dgm:pt modelId="1"/>
+        <dgm:pt modelId="11"/>
+        <dgm:pt modelId="2"/>
+        <dgm:pt modelId="21"/>
+      </dgm:ptLst>
+      <dgm:cxnLst>
+        <dgm:cxn modelId="4" srcId="0" destId="1" srcOrd="0" destOrd="0"/>
+        <dgm:cxn modelId="5" srcId="0" destId="2" srcOrd="1" destOrd="0"/>
+        <dgm:cxn modelId="13" srcId="1" destId="11" srcOrd="0" destOrd="0"/>
+        <dgm:cxn modelId="23" srcId="2" destId="21" srcOrd="0" destOrd="0"/>
+      </dgm:cxnLst>
+      <dgm:bg/>
+      <dgm:whole/>
+    </dgm:dataModel>
+  </dgm:styleData>
+  <dgm:clrData>
+    <dgm:dataModel>
+      <dgm:ptLst>
+        <dgm:pt modelId="0" type="doc"/>
+        <dgm:pt modelId="1"/>
+        <dgm:pt modelId="11"/>
+        <dgm:pt modelId="2"/>
+        <dgm:pt modelId="21"/>
+        <dgm:pt modelId="3"/>
+        <dgm:pt modelId="31"/>
+        <dgm:pt modelId="4"/>
+        <dgm:pt modelId="41"/>
+      </dgm:ptLst>
+      <dgm:cxnLst>
+        <dgm:cxn modelId="5" srcId="0" destId="1" srcOrd="0" destOrd="0"/>
+        <dgm:cxn modelId="6" srcId="0" destId="2" srcOrd="1" destOrd="0"/>
+        <dgm:cxn modelId="7" srcId="0" destId="3" srcOrd="2" destOrd="0"/>
+        <dgm:cxn modelId="8" srcId="0" destId="4" srcOrd="3" destOrd="0"/>
+        <dgm:cxn modelId="13" srcId="1" destId="11" srcOrd="0" destOrd="0"/>
+        <dgm:cxn modelId="23" srcId="2" destId="21" srcOrd="0" destOrd="0"/>
+        <dgm:cxn modelId="33" srcId="3" destId="31" srcOrd="0" destOrd="0"/>
+        <dgm:cxn modelId="43" srcId="4" destId="41" srcOrd="0" destOrd="0"/>
+      </dgm:cxnLst>
+      <dgm:bg/>
+      <dgm:whole/>
+    </dgm:dataModel>
+  </dgm:clrData>
+  <dgm:layoutNode name="Name0">
+    <dgm:varLst>
+      <dgm:dir/>
+      <dgm:animLvl val="lvl"/>
+      <dgm:resizeHandles val="exact"/>
+    </dgm:varLst>
+    <dgm:choose name="Name1">
+      <dgm:if name="Name2" func="var" arg="dir" op="equ" val="norm">
+        <dgm:alg type="lin">
+          <dgm:param type="linDir" val="fromT"/>
+          <dgm:param type="nodeHorzAlign" val="l"/>
+        </dgm:alg>
+      </dgm:if>
+      <dgm:else name="Name3">
+        <dgm:alg type="lin">
+          <dgm:param type="linDir" val="fromT"/>
+          <dgm:param type="nodeHorzAlign" val="r"/>
+        </dgm:alg>
+      </dgm:else>
+    </dgm:choose>
+    <dgm:shape xmlns:r="http://schemas.openxmlformats.org/officeDocument/2006/relationships" r:blip="">
+      <dgm:adjLst/>
+    </dgm:shape>
+    <dgm:presOf/>
+    <dgm:constrLst>
+      <dgm:constr type="h" for="ch" forName="linNode" refType="h"/>
+      <dgm:constr type="w" for="ch" forName="linNode" refType="w"/>
+      <dgm:constr type="h" for="ch" forName="sp" refType="h" fact="0.05"/>
+      <dgm:constr type="primFontSz" for="des" forName="parentText" op="equ" val="65"/>
+      <dgm:constr type="secFontSz" for="des" forName="descendantText" op="equ"/>
+    </dgm:constrLst>
+    <dgm:ruleLst/>
+    <dgm:forEach name="Name4" axis="ch" ptType="node">
+      <dgm:layoutNode name="linNode">
+        <dgm:choose name="Name5">
+          <dgm:if name="Name6" func="var" arg="dir" op="equ" val="norm">
+            <dgm:alg type="lin">
+              <dgm:param type="linDir" val="fromL"/>
+            </dgm:alg>
+          </dgm:if>
+          <dgm:else name="Name7">
+            <dgm:alg type="lin">
+              <dgm:param type="linDir" val="fromR"/>
+            </dgm:alg>
+          </dgm:else>
+        </dgm:choose>
+        <dgm:shape xmlns:r="http://schemas.openxmlformats.org/officeDocument/2006/relationships" r:blip="">
+          <dgm:adjLst/>
+        </dgm:shape>
+        <dgm:presOf/>
+        <dgm:constrLst>
+          <dgm:constr type="w" for="ch" forName="parentText" refType="w" fact="0.36"/>
+          <dgm:constr type="w" for="ch" forName="descendantText" refType="w" fact="0.64"/>
+          <dgm:constr type="h" for="ch" forName="parentText" refType="h"/>
+          <dgm:constr type="h" for="ch" forName="descendantText" refType="h" refFor="ch" refForName="parentText" fact="0.8"/>
+        </dgm:constrLst>
+        <dgm:ruleLst/>
+        <dgm:layoutNode name="parentText">
+          <dgm:varLst>
+            <dgm:chMax val="1"/>
+            <dgm:bulletEnabled val="1"/>
+          </dgm:varLst>
+          <dgm:alg type="tx"/>
+          <dgm:shape xmlns:r="http://schemas.openxmlformats.org/officeDocument/2006/relationships" type="roundRect" r:blip="" zOrderOff="3">
+            <dgm:adjLst/>
+          </dgm:shape>
+          <dgm:presOf axis="self" ptType="node"/>
+          <dgm:constrLst>
+            <dgm:constr type="tMarg" refType="primFontSz" fact="0.15"/>
+            <dgm:constr type="bMarg" refType="primFontSz" fact="0.15"/>
+            <dgm:constr type="lMarg" refType="primFontSz" fact="0.3"/>
+            <dgm:constr type="rMarg" refType="primFontSz" fact="0.3"/>
+          </dgm:constrLst>
+          <dgm:ruleLst>
+            <dgm:rule type="primFontSz" val="5" fact="NaN" max="NaN"/>
+          </dgm:ruleLst>
+        </dgm:layoutNode>
+        <dgm:choose name="Name8">
+          <dgm:if name="Name9" axis="ch" ptType="node" func="cnt" op="gte" val="1">
+            <dgm:layoutNode name="descendantText" styleLbl="alignAccFollowNode1">
+              <dgm:varLst>
+                <dgm:bulletEnabled val="1"/>
+              </dgm:varLst>
+              <dgm:alg type="tx">
+                <dgm:param type="stBulletLvl" val="1"/>
+                <dgm:param type="txAnchorVertCh" val="mid"/>
+              </dgm:alg>
+              <dgm:choose name="Name10">
+                <dgm:if name="Name11" func="var" arg="dir" op="equ" val="norm">
+                  <dgm:shape xmlns:r="http://schemas.openxmlformats.org/officeDocument/2006/relationships" rot="90" type="round2SameRect" r:blip="">
+                    <dgm:adjLst/>
+                  </dgm:shape>
+                </dgm:if>
+                <dgm:else name="Name12">
+                  <dgm:shape xmlns:r="http://schemas.openxmlformats.org/officeDocument/2006/relationships" rot="-90" type="round2SameRect" r:blip="">
+                    <dgm:adjLst/>
+                  </dgm:shape>
+                </dgm:else>
+              </dgm:choose>
+              <dgm:presOf axis="des" ptType="node"/>
+              <dgm:constrLst>
+                <dgm:constr type="secFontSz" val="65"/>
+                <dgm:constr type="primFontSz" refType="secFontSz"/>
+                <dgm:constr type="lMarg" refType="secFontSz" fact="0.3"/>
+                <dgm:constr type="rMarg" refType="secFontSz" fact="0.3"/>
+                <dgm:constr type="tMarg" refType="secFontSz" fact="0.15"/>
+                <dgm:constr type="bMarg" refType="secFontSz" fact="0.15"/>
+              </dgm:constrLst>
+              <dgm:ruleLst>
+                <dgm:rule type="secFontSz" val="5" fact="NaN" max="NaN"/>
+              </dgm:ruleLst>
+            </dgm:layoutNode>
+          </dgm:if>
+          <dgm:else name="Name13"/>
+        </dgm:choose>
+      </dgm:layoutNode>
+      <dgm:forEach name="Name14" axis="followSib" ptType="sibTrans" cnt="1">
+        <dgm:layoutNode name="sp">
+          <dgm:alg type="sp"/>
+          <dgm:shape xmlns:r="http://schemas.openxmlformats.org/officeDocument/2006/relationships" r:blip="">
+            <dgm:adjLst/>
+          </dgm:shape>
+          <dgm:presOf/>
+          <dgm:constrLst/>
+          <dgm:ruleLst/>
+        </dgm:layoutNode>
+      </dgm:forEach>
+    </dgm:forEach>
+  </dgm:layoutNode>
+</dgm:layoutDef>
+</file>
+
+<file path=ppt/diagrams/layout3.xml><?xml version="1.0" encoding="utf-8"?>
 <dgm:layoutDef xmlns:dgm="http://schemas.openxmlformats.org/drawingml/2006/diagram" xmlns:a="http://schemas.openxmlformats.org/drawingml/2006/main" uniqueId="urn:microsoft.com/office/officeart/2018/2/layout/IconVerticalSolidList">
   <dgm:title val="Icon Vertical Solid List"/>
   <dgm:desc val="Use to show a series of visuals from top to bottom with Level 1 or Level 1 and Level 2 text grouped in a shape. Works best with icons or small pictures with lengthier descriptions."/>
@@ -6632,7 +8453,7 @@
 </dgm:layoutDef>
 </file>
 
-<file path=ppt/diagrams/layout3.xml><?xml version="1.0" encoding="utf-8"?>
+<file path=ppt/diagrams/layout4.xml><?xml version="1.0" encoding="utf-8"?>
 <dgm:layoutDef xmlns:dgm="http://schemas.openxmlformats.org/drawingml/2006/diagram" xmlns:a="http://schemas.openxmlformats.org/drawingml/2006/main" uniqueId="urn:microsoft.com/office/officeart/2005/8/layout/vList2">
   <dgm:title val=""/>
   <dgm:desc val=""/>
@@ -6799,7 +8620,7 @@
 </dgm:layoutDef>
 </file>
 
-<file path=ppt/diagrams/layout4.xml><?xml version="1.0" encoding="utf-8"?>
+<file path=ppt/diagrams/layout5.xml><?xml version="1.0" encoding="utf-8"?>
 <dgm:layoutDef xmlns:dgm="http://schemas.openxmlformats.org/drawingml/2006/diagram" xmlns:a="http://schemas.openxmlformats.org/drawingml/2006/main" uniqueId="urn:microsoft.com/office/officeart/2018/2/layout/IconLabelList">
   <dgm:title val="Icon Label List"/>
   <dgm:desc val="Use to show non-sequential or grouped chunks of information accompanied by a related visuals. Works best with icons or small pictures with short text captions."/>
@@ -9058,6 +10879,1040 @@
 </file>
 
 <file path=ppt/diagrams/quickStyle3.xml><?xml version="1.0" encoding="utf-8"?>
+<dgm:styleDef xmlns:dgm="http://schemas.openxmlformats.org/drawingml/2006/diagram" xmlns:a="http://schemas.openxmlformats.org/drawingml/2006/main" uniqueId="urn:microsoft.com/office/officeart/2005/8/quickstyle/simple1">
+  <dgm:title val=""/>
+  <dgm:desc val=""/>
+  <dgm:catLst>
+    <dgm:cat type="simple" pri="10100"/>
+  </dgm:catLst>
+  <dgm:scene3d>
+    <a:camera prst="orthographicFront"/>
+    <a:lightRig rig="threePt" dir="t"/>
+  </dgm:scene3d>
+  <dgm:styleLbl name="node0">
+    <dgm:scene3d>
+      <a:camera prst="orthographicFront"/>
+      <a:lightRig rig="threePt" dir="t"/>
+    </dgm:scene3d>
+    <dgm:sp3d/>
+    <dgm:txPr/>
+    <dgm:style>
+      <a:lnRef idx="2">
+        <a:scrgbClr r="0" g="0" b="0"/>
+      </a:lnRef>
+      <a:fillRef idx="1">
+        <a:scrgbClr r="0" g="0" b="0"/>
+      </a:fillRef>
+      <a:effectRef idx="0">
+        <a:scrgbClr r="0" g="0" b="0"/>
+      </a:effectRef>
+      <a:fontRef idx="minor">
+        <a:schemeClr val="lt1"/>
+      </a:fontRef>
+    </dgm:style>
+  </dgm:styleLbl>
+  <dgm:styleLbl name="lnNode1">
+    <dgm:scene3d>
+      <a:camera prst="orthographicFront"/>
+      <a:lightRig rig="threePt" dir="t"/>
+    </dgm:scene3d>
+    <dgm:sp3d/>
+    <dgm:txPr/>
+    <dgm:style>
+      <a:lnRef idx="2">
+        <a:scrgbClr r="0" g="0" b="0"/>
+      </a:lnRef>
+      <a:fillRef idx="1">
+        <a:scrgbClr r="0" g="0" b="0"/>
+      </a:fillRef>
+      <a:effectRef idx="0">
+        <a:scrgbClr r="0" g="0" b="0"/>
+      </a:effectRef>
+      <a:fontRef idx="minor">
+        <a:schemeClr val="lt1"/>
+      </a:fontRef>
+    </dgm:style>
+  </dgm:styleLbl>
+  <dgm:styleLbl name="vennNode1">
+    <dgm:scene3d>
+      <a:camera prst="orthographicFront"/>
+      <a:lightRig rig="threePt" dir="t"/>
+    </dgm:scene3d>
+    <dgm:sp3d/>
+    <dgm:txPr/>
+    <dgm:style>
+      <a:lnRef idx="2">
+        <a:scrgbClr r="0" g="0" b="0"/>
+      </a:lnRef>
+      <a:fillRef idx="1">
+        <a:scrgbClr r="0" g="0" b="0"/>
+      </a:fillRef>
+      <a:effectRef idx="0">
+        <a:scrgbClr r="0" g="0" b="0"/>
+      </a:effectRef>
+      <a:fontRef idx="minor">
+        <a:schemeClr val="tx1"/>
+      </a:fontRef>
+    </dgm:style>
+  </dgm:styleLbl>
+  <dgm:styleLbl name="alignNode1">
+    <dgm:scene3d>
+      <a:camera prst="orthographicFront"/>
+      <a:lightRig rig="threePt" dir="t"/>
+    </dgm:scene3d>
+    <dgm:sp3d/>
+    <dgm:txPr/>
+    <dgm:style>
+      <a:lnRef idx="2">
+        <a:scrgbClr r="0" g="0" b="0"/>
+      </a:lnRef>
+      <a:fillRef idx="1">
+        <a:scrgbClr r="0" g="0" b="0"/>
+      </a:fillRef>
+      <a:effectRef idx="0">
+        <a:scrgbClr r="0" g="0" b="0"/>
+      </a:effectRef>
+      <a:fontRef idx="minor">
+        <a:schemeClr val="lt1"/>
+      </a:fontRef>
+    </dgm:style>
+  </dgm:styleLbl>
+  <dgm:styleLbl name="node1">
+    <dgm:scene3d>
+      <a:camera prst="orthographicFront"/>
+      <a:lightRig rig="threePt" dir="t"/>
+    </dgm:scene3d>
+    <dgm:sp3d/>
+    <dgm:txPr/>
+    <dgm:style>
+      <a:lnRef idx="2">
+        <a:scrgbClr r="0" g="0" b="0"/>
+      </a:lnRef>
+      <a:fillRef idx="1">
+        <a:scrgbClr r="0" g="0" b="0"/>
+      </a:fillRef>
+      <a:effectRef idx="0">
+        <a:scrgbClr r="0" g="0" b="0"/>
+      </a:effectRef>
+      <a:fontRef idx="minor">
+        <a:schemeClr val="lt1"/>
+      </a:fontRef>
+    </dgm:style>
+  </dgm:styleLbl>
+  <dgm:styleLbl name="node2">
+    <dgm:scene3d>
+      <a:camera prst="orthographicFront"/>
+      <a:lightRig rig="threePt" dir="t"/>
+    </dgm:scene3d>
+    <dgm:sp3d/>
+    <dgm:txPr/>
+    <dgm:style>
+      <a:lnRef idx="2">
+        <a:scrgbClr r="0" g="0" b="0"/>
+      </a:lnRef>
+      <a:fillRef idx="1">
+        <a:scrgbClr r="0" g="0" b="0"/>
+      </a:fillRef>
+      <a:effectRef idx="0">
+        <a:scrgbClr r="0" g="0" b="0"/>
+      </a:effectRef>
+      <a:fontRef idx="minor">
+        <a:schemeClr val="lt1"/>
+      </a:fontRef>
+    </dgm:style>
+  </dgm:styleLbl>
+  <dgm:styleLbl name="node3">
+    <dgm:scene3d>
+      <a:camera prst="orthographicFront"/>
+      <a:lightRig rig="threePt" dir="t"/>
+    </dgm:scene3d>
+    <dgm:sp3d/>
+    <dgm:txPr/>
+    <dgm:style>
+      <a:lnRef idx="2">
+        <a:scrgbClr r="0" g="0" b="0"/>
+      </a:lnRef>
+      <a:fillRef idx="1">
+        <a:scrgbClr r="0" g="0" b="0"/>
+      </a:fillRef>
+      <a:effectRef idx="0">
+        <a:scrgbClr r="0" g="0" b="0"/>
+      </a:effectRef>
+      <a:fontRef idx="minor">
+        <a:schemeClr val="lt1"/>
+      </a:fontRef>
+    </dgm:style>
+  </dgm:styleLbl>
+  <dgm:styleLbl name="node4">
+    <dgm:scene3d>
+      <a:camera prst="orthographicFront"/>
+      <a:lightRig rig="threePt" dir="t"/>
+    </dgm:scene3d>
+    <dgm:sp3d/>
+    <dgm:txPr/>
+    <dgm:style>
+      <a:lnRef idx="2">
+        <a:scrgbClr r="0" g="0" b="0"/>
+      </a:lnRef>
+      <a:fillRef idx="1">
+        <a:scrgbClr r="0" g="0" b="0"/>
+      </a:fillRef>
+      <a:effectRef idx="0">
+        <a:scrgbClr r="0" g="0" b="0"/>
+      </a:effectRef>
+      <a:fontRef idx="minor">
+        <a:schemeClr val="lt1"/>
+      </a:fontRef>
+    </dgm:style>
+  </dgm:styleLbl>
+  <dgm:styleLbl name="fgImgPlace1">
+    <dgm:scene3d>
+      <a:camera prst="orthographicFront"/>
+      <a:lightRig rig="threePt" dir="t"/>
+    </dgm:scene3d>
+    <dgm:sp3d/>
+    <dgm:txPr/>
+    <dgm:style>
+      <a:lnRef idx="2">
+        <a:scrgbClr r="0" g="0" b="0"/>
+      </a:lnRef>
+      <a:fillRef idx="1">
+        <a:scrgbClr r="0" g="0" b="0"/>
+      </a:fillRef>
+      <a:effectRef idx="0">
+        <a:scrgbClr r="0" g="0" b="0"/>
+      </a:effectRef>
+      <a:fontRef idx="minor"/>
+    </dgm:style>
+  </dgm:styleLbl>
+  <dgm:styleLbl name="alignImgPlace1">
+    <dgm:scene3d>
+      <a:camera prst="orthographicFront"/>
+      <a:lightRig rig="threePt" dir="t"/>
+    </dgm:scene3d>
+    <dgm:sp3d/>
+    <dgm:txPr/>
+    <dgm:style>
+      <a:lnRef idx="2">
+        <a:scrgbClr r="0" g="0" b="0"/>
+      </a:lnRef>
+      <a:fillRef idx="1">
+        <a:scrgbClr r="0" g="0" b="0"/>
+      </a:fillRef>
+      <a:effectRef idx="0">
+        <a:scrgbClr r="0" g="0" b="0"/>
+      </a:effectRef>
+      <a:fontRef idx="minor"/>
+    </dgm:style>
+  </dgm:styleLbl>
+  <dgm:styleLbl name="bgImgPlace1">
+    <dgm:scene3d>
+      <a:camera prst="orthographicFront"/>
+      <a:lightRig rig="threePt" dir="t"/>
+    </dgm:scene3d>
+    <dgm:sp3d/>
+    <dgm:txPr/>
+    <dgm:style>
+      <a:lnRef idx="2">
+        <a:scrgbClr r="0" g="0" b="0"/>
+      </a:lnRef>
+      <a:fillRef idx="1">
+        <a:scrgbClr r="0" g="0" b="0"/>
+      </a:fillRef>
+      <a:effectRef idx="0">
+        <a:scrgbClr r="0" g="0" b="0"/>
+      </a:effectRef>
+      <a:fontRef idx="minor"/>
+    </dgm:style>
+  </dgm:styleLbl>
+  <dgm:styleLbl name="sibTrans2D1">
+    <dgm:scene3d>
+      <a:camera prst="orthographicFront"/>
+      <a:lightRig rig="threePt" dir="t"/>
+    </dgm:scene3d>
+    <dgm:sp3d/>
+    <dgm:txPr/>
+    <dgm:style>
+      <a:lnRef idx="0">
+        <a:scrgbClr r="0" g="0" b="0"/>
+      </a:lnRef>
+      <a:fillRef idx="1">
+        <a:scrgbClr r="0" g="0" b="0"/>
+      </a:fillRef>
+      <a:effectRef idx="0">
+        <a:scrgbClr r="0" g="0" b="0"/>
+      </a:effectRef>
+      <a:fontRef idx="minor">
+        <a:schemeClr val="lt1"/>
+      </a:fontRef>
+    </dgm:style>
+  </dgm:styleLbl>
+  <dgm:styleLbl name="fgSibTrans2D1">
+    <dgm:scene3d>
+      <a:camera prst="orthographicFront"/>
+      <a:lightRig rig="threePt" dir="t"/>
+    </dgm:scene3d>
+    <dgm:sp3d/>
+    <dgm:txPr/>
+    <dgm:style>
+      <a:lnRef idx="0">
+        <a:scrgbClr r="0" g="0" b="0"/>
+      </a:lnRef>
+      <a:fillRef idx="1">
+        <a:scrgbClr r="0" g="0" b="0"/>
+      </a:fillRef>
+      <a:effectRef idx="0">
+        <a:scrgbClr r="0" g="0" b="0"/>
+      </a:effectRef>
+      <a:fontRef idx="minor">
+        <a:schemeClr val="lt1"/>
+      </a:fontRef>
+    </dgm:style>
+  </dgm:styleLbl>
+  <dgm:styleLbl name="bgSibTrans2D1">
+    <dgm:scene3d>
+      <a:camera prst="orthographicFront"/>
+      <a:lightRig rig="threePt" dir="t"/>
+    </dgm:scene3d>
+    <dgm:sp3d/>
+    <dgm:txPr/>
+    <dgm:style>
+      <a:lnRef idx="0">
+        <a:scrgbClr r="0" g="0" b="0"/>
+      </a:lnRef>
+      <a:fillRef idx="1">
+        <a:scrgbClr r="0" g="0" b="0"/>
+      </a:fillRef>
+      <a:effectRef idx="0">
+        <a:scrgbClr r="0" g="0" b="0"/>
+      </a:effectRef>
+      <a:fontRef idx="minor">
+        <a:schemeClr val="lt1"/>
+      </a:fontRef>
+    </dgm:style>
+  </dgm:styleLbl>
+  <dgm:styleLbl name="sibTrans1D1">
+    <dgm:scene3d>
+      <a:camera prst="orthographicFront"/>
+      <a:lightRig rig="threePt" dir="t"/>
+    </dgm:scene3d>
+    <dgm:sp3d/>
+    <dgm:txPr/>
+    <dgm:style>
+      <a:lnRef idx="1">
+        <a:scrgbClr r="0" g="0" b="0"/>
+      </a:lnRef>
+      <a:fillRef idx="0">
+        <a:scrgbClr r="0" g="0" b="0"/>
+      </a:fillRef>
+      <a:effectRef idx="0">
+        <a:scrgbClr r="0" g="0" b="0"/>
+      </a:effectRef>
+      <a:fontRef idx="minor"/>
+    </dgm:style>
+  </dgm:styleLbl>
+  <dgm:styleLbl name="callout">
+    <dgm:scene3d>
+      <a:camera prst="orthographicFront"/>
+      <a:lightRig rig="threePt" dir="t"/>
+    </dgm:scene3d>
+    <dgm:sp3d/>
+    <dgm:txPr/>
+    <dgm:style>
+      <a:lnRef idx="2">
+        <a:scrgbClr r="0" g="0" b="0"/>
+      </a:lnRef>
+      <a:fillRef idx="1">
+        <a:scrgbClr r="0" g="0" b="0"/>
+      </a:fillRef>
+      <a:effectRef idx="0">
+        <a:scrgbClr r="0" g="0" b="0"/>
+      </a:effectRef>
+      <a:fontRef idx="minor"/>
+    </dgm:style>
+  </dgm:styleLbl>
+  <dgm:styleLbl name="asst0">
+    <dgm:scene3d>
+      <a:camera prst="orthographicFront"/>
+      <a:lightRig rig="threePt" dir="t"/>
+    </dgm:scene3d>
+    <dgm:sp3d/>
+    <dgm:txPr/>
+    <dgm:style>
+      <a:lnRef idx="2">
+        <a:scrgbClr r="0" g="0" b="0"/>
+      </a:lnRef>
+      <a:fillRef idx="1">
+        <a:scrgbClr r="0" g="0" b="0"/>
+      </a:fillRef>
+      <a:effectRef idx="0">
+        <a:scrgbClr r="0" g="0" b="0"/>
+      </a:effectRef>
+      <a:fontRef idx="minor">
+        <a:schemeClr val="lt1"/>
+      </a:fontRef>
+    </dgm:style>
+  </dgm:styleLbl>
+  <dgm:styleLbl name="asst1">
+    <dgm:scene3d>
+      <a:camera prst="orthographicFront"/>
+      <a:lightRig rig="threePt" dir="t"/>
+    </dgm:scene3d>
+    <dgm:sp3d/>
+    <dgm:txPr/>
+    <dgm:style>
+      <a:lnRef idx="2">
+        <a:scrgbClr r="0" g="0" b="0"/>
+      </a:lnRef>
+      <a:fillRef idx="1">
+        <a:scrgbClr r="0" g="0" b="0"/>
+      </a:fillRef>
+      <a:effectRef idx="0">
+        <a:scrgbClr r="0" g="0" b="0"/>
+      </a:effectRef>
+      <a:fontRef idx="minor">
+        <a:schemeClr val="lt1"/>
+      </a:fontRef>
+    </dgm:style>
+  </dgm:styleLbl>
+  <dgm:styleLbl name="asst2">
+    <dgm:scene3d>
+      <a:camera prst="orthographicFront"/>
+      <a:lightRig rig="threePt" dir="t"/>
+    </dgm:scene3d>
+    <dgm:sp3d/>
+    <dgm:txPr/>
+    <dgm:style>
+      <a:lnRef idx="2">
+        <a:scrgbClr r="0" g="0" b="0"/>
+      </a:lnRef>
+      <a:fillRef idx="1">
+        <a:scrgbClr r="0" g="0" b="0"/>
+      </a:fillRef>
+      <a:effectRef idx="0">
+        <a:scrgbClr r="0" g="0" b="0"/>
+      </a:effectRef>
+      <a:fontRef idx="minor">
+        <a:schemeClr val="lt1"/>
+      </a:fontRef>
+    </dgm:style>
+  </dgm:styleLbl>
+  <dgm:styleLbl name="asst3">
+    <dgm:scene3d>
+      <a:camera prst="orthographicFront"/>
+      <a:lightRig rig="threePt" dir="t"/>
+    </dgm:scene3d>
+    <dgm:sp3d/>
+    <dgm:txPr/>
+    <dgm:style>
+      <a:lnRef idx="2">
+        <a:scrgbClr r="0" g="0" b="0"/>
+      </a:lnRef>
+      <a:fillRef idx="1">
+        <a:scrgbClr r="0" g="0" b="0"/>
+      </a:fillRef>
+      <a:effectRef idx="0">
+        <a:scrgbClr r="0" g="0" b="0"/>
+      </a:effectRef>
+      <a:fontRef idx="minor">
+        <a:schemeClr val="lt1"/>
+      </a:fontRef>
+    </dgm:style>
+  </dgm:styleLbl>
+  <dgm:styleLbl name="asst4">
+    <dgm:scene3d>
+      <a:camera prst="orthographicFront"/>
+      <a:lightRig rig="threePt" dir="t"/>
+    </dgm:scene3d>
+    <dgm:sp3d/>
+    <dgm:txPr/>
+    <dgm:style>
+      <a:lnRef idx="2">
+        <a:scrgbClr r="0" g="0" b="0"/>
+      </a:lnRef>
+      <a:fillRef idx="1">
+        <a:scrgbClr r="0" g="0" b="0"/>
+      </a:fillRef>
+      <a:effectRef idx="0">
+        <a:scrgbClr r="0" g="0" b="0"/>
+      </a:effectRef>
+      <a:fontRef idx="minor">
+        <a:schemeClr val="lt1"/>
+      </a:fontRef>
+    </dgm:style>
+  </dgm:styleLbl>
+  <dgm:styleLbl name="parChTrans2D1">
+    <dgm:scene3d>
+      <a:camera prst="orthographicFront"/>
+      <a:lightRig rig="threePt" dir="t"/>
+    </dgm:scene3d>
+    <dgm:sp3d/>
+    <dgm:txPr/>
+    <dgm:style>
+      <a:lnRef idx="2">
+        <a:scrgbClr r="0" g="0" b="0"/>
+      </a:lnRef>
+      <a:fillRef idx="1">
+        <a:scrgbClr r="0" g="0" b="0"/>
+      </a:fillRef>
+      <a:effectRef idx="0">
+        <a:scrgbClr r="0" g="0" b="0"/>
+      </a:effectRef>
+      <a:fontRef idx="minor">
+        <a:schemeClr val="lt1"/>
+      </a:fontRef>
+    </dgm:style>
+  </dgm:styleLbl>
+  <dgm:styleLbl name="parChTrans2D2">
+    <dgm:scene3d>
+      <a:camera prst="orthographicFront"/>
+      <a:lightRig rig="threePt" dir="t"/>
+    </dgm:scene3d>
+    <dgm:sp3d/>
+    <dgm:txPr/>
+    <dgm:style>
+      <a:lnRef idx="2">
+        <a:scrgbClr r="0" g="0" b="0"/>
+      </a:lnRef>
+      <a:fillRef idx="1">
+        <a:scrgbClr r="0" g="0" b="0"/>
+      </a:fillRef>
+      <a:effectRef idx="0">
+        <a:scrgbClr r="0" g="0" b="0"/>
+      </a:effectRef>
+      <a:fontRef idx="minor">
+        <a:schemeClr val="lt1"/>
+      </a:fontRef>
+    </dgm:style>
+  </dgm:styleLbl>
+  <dgm:styleLbl name="parChTrans2D3">
+    <dgm:scene3d>
+      <a:camera prst="orthographicFront"/>
+      <a:lightRig rig="threePt" dir="t"/>
+    </dgm:scene3d>
+    <dgm:sp3d/>
+    <dgm:txPr/>
+    <dgm:style>
+      <a:lnRef idx="2">
+        <a:scrgbClr r="0" g="0" b="0"/>
+      </a:lnRef>
+      <a:fillRef idx="1">
+        <a:scrgbClr r="0" g="0" b="0"/>
+      </a:fillRef>
+      <a:effectRef idx="0">
+        <a:scrgbClr r="0" g="0" b="0"/>
+      </a:effectRef>
+      <a:fontRef idx="minor">
+        <a:schemeClr val="lt1"/>
+      </a:fontRef>
+    </dgm:style>
+  </dgm:styleLbl>
+  <dgm:styleLbl name="parChTrans2D4">
+    <dgm:scene3d>
+      <a:camera prst="orthographicFront"/>
+      <a:lightRig rig="threePt" dir="t"/>
+    </dgm:scene3d>
+    <dgm:sp3d/>
+    <dgm:txPr/>
+    <dgm:style>
+      <a:lnRef idx="2">
+        <a:scrgbClr r="0" g="0" b="0"/>
+      </a:lnRef>
+      <a:fillRef idx="1">
+        <a:scrgbClr r="0" g="0" b="0"/>
+      </a:fillRef>
+      <a:effectRef idx="0">
+        <a:scrgbClr r="0" g="0" b="0"/>
+      </a:effectRef>
+      <a:fontRef idx="minor">
+        <a:schemeClr val="lt1"/>
+      </a:fontRef>
+    </dgm:style>
+  </dgm:styleLbl>
+  <dgm:styleLbl name="parChTrans1D1">
+    <dgm:scene3d>
+      <a:camera prst="orthographicFront"/>
+      <a:lightRig rig="threePt" dir="t"/>
+    </dgm:scene3d>
+    <dgm:sp3d/>
+    <dgm:txPr/>
+    <dgm:style>
+      <a:lnRef idx="2">
+        <a:scrgbClr r="0" g="0" b="0"/>
+      </a:lnRef>
+      <a:fillRef idx="0">
+        <a:scrgbClr r="0" g="0" b="0"/>
+      </a:fillRef>
+      <a:effectRef idx="0">
+        <a:scrgbClr r="0" g="0" b="0"/>
+      </a:effectRef>
+      <a:fontRef idx="minor"/>
+    </dgm:style>
+  </dgm:styleLbl>
+  <dgm:styleLbl name="parChTrans1D2">
+    <dgm:scene3d>
+      <a:camera prst="orthographicFront"/>
+      <a:lightRig rig="threePt" dir="t"/>
+    </dgm:scene3d>
+    <dgm:sp3d/>
+    <dgm:txPr/>
+    <dgm:style>
+      <a:lnRef idx="2">
+        <a:scrgbClr r="0" g="0" b="0"/>
+      </a:lnRef>
+      <a:fillRef idx="0">
+        <a:scrgbClr r="0" g="0" b="0"/>
+      </a:fillRef>
+      <a:effectRef idx="0">
+        <a:scrgbClr r="0" g="0" b="0"/>
+      </a:effectRef>
+      <a:fontRef idx="minor"/>
+    </dgm:style>
+  </dgm:styleLbl>
+  <dgm:styleLbl name="parChTrans1D3">
+    <dgm:scene3d>
+      <a:camera prst="orthographicFront"/>
+      <a:lightRig rig="threePt" dir="t"/>
+    </dgm:scene3d>
+    <dgm:sp3d/>
+    <dgm:txPr/>
+    <dgm:style>
+      <a:lnRef idx="2">
+        <a:scrgbClr r="0" g="0" b="0"/>
+      </a:lnRef>
+      <a:fillRef idx="0">
+        <a:scrgbClr r="0" g="0" b="0"/>
+      </a:fillRef>
+      <a:effectRef idx="0">
+        <a:scrgbClr r="0" g="0" b="0"/>
+      </a:effectRef>
+      <a:fontRef idx="minor"/>
+    </dgm:style>
+  </dgm:styleLbl>
+  <dgm:styleLbl name="parChTrans1D4">
+    <dgm:scene3d>
+      <a:camera prst="orthographicFront"/>
+      <a:lightRig rig="threePt" dir="t"/>
+    </dgm:scene3d>
+    <dgm:sp3d/>
+    <dgm:txPr/>
+    <dgm:style>
+      <a:lnRef idx="2">
+        <a:scrgbClr r="0" g="0" b="0"/>
+      </a:lnRef>
+      <a:fillRef idx="0">
+        <a:scrgbClr r="0" g="0" b="0"/>
+      </a:fillRef>
+      <a:effectRef idx="0">
+        <a:scrgbClr r="0" g="0" b="0"/>
+      </a:effectRef>
+      <a:fontRef idx="minor"/>
+    </dgm:style>
+  </dgm:styleLbl>
+  <dgm:styleLbl name="fgAcc1">
+    <dgm:scene3d>
+      <a:camera prst="orthographicFront"/>
+      <a:lightRig rig="threePt" dir="t"/>
+    </dgm:scene3d>
+    <dgm:sp3d/>
+    <dgm:txPr/>
+    <dgm:style>
+      <a:lnRef idx="2">
+        <a:scrgbClr r="0" g="0" b="0"/>
+      </a:lnRef>
+      <a:fillRef idx="1">
+        <a:scrgbClr r="0" g="0" b="0"/>
+      </a:fillRef>
+      <a:effectRef idx="0">
+        <a:scrgbClr r="0" g="0" b="0"/>
+      </a:effectRef>
+      <a:fontRef idx="minor"/>
+    </dgm:style>
+  </dgm:styleLbl>
+  <dgm:styleLbl name="conFgAcc1">
+    <dgm:scene3d>
+      <a:camera prst="orthographicFront"/>
+      <a:lightRig rig="threePt" dir="t"/>
+    </dgm:scene3d>
+    <dgm:sp3d/>
+    <dgm:txPr/>
+    <dgm:style>
+      <a:lnRef idx="2">
+        <a:scrgbClr r="0" g="0" b="0"/>
+      </a:lnRef>
+      <a:fillRef idx="1">
+        <a:scrgbClr r="0" g="0" b="0"/>
+      </a:fillRef>
+      <a:effectRef idx="0">
+        <a:scrgbClr r="0" g="0" b="0"/>
+      </a:effectRef>
+      <a:fontRef idx="minor"/>
+    </dgm:style>
+  </dgm:styleLbl>
+  <dgm:styleLbl name="alignAcc1">
+    <dgm:scene3d>
+      <a:camera prst="orthographicFront"/>
+      <a:lightRig rig="threePt" dir="t"/>
+    </dgm:scene3d>
+    <dgm:sp3d/>
+    <dgm:txPr/>
+    <dgm:style>
+      <a:lnRef idx="2">
+        <a:scrgbClr r="0" g="0" b="0"/>
+      </a:lnRef>
+      <a:fillRef idx="1">
+        <a:scrgbClr r="0" g="0" b="0"/>
+      </a:fillRef>
+      <a:effectRef idx="0">
+        <a:scrgbClr r="0" g="0" b="0"/>
+      </a:effectRef>
+      <a:fontRef idx="minor"/>
+    </dgm:style>
+  </dgm:styleLbl>
+  <dgm:styleLbl name="trAlignAcc1">
+    <dgm:scene3d>
+      <a:camera prst="orthographicFront"/>
+      <a:lightRig rig="threePt" dir="t"/>
+    </dgm:scene3d>
+    <dgm:sp3d/>
+    <dgm:txPr/>
+    <dgm:style>
+      <a:lnRef idx="1">
+        <a:scrgbClr r="0" g="0" b="0"/>
+      </a:lnRef>
+      <a:fillRef idx="1">
+        <a:scrgbClr r="0" g="0" b="0"/>
+      </a:fillRef>
+      <a:effectRef idx="0">
+        <a:scrgbClr r="0" g="0" b="0"/>
+      </a:effectRef>
+      <a:fontRef idx="minor"/>
+    </dgm:style>
+  </dgm:styleLbl>
+  <dgm:styleLbl name="bgAcc1">
+    <dgm:scene3d>
+      <a:camera prst="orthographicFront"/>
+      <a:lightRig rig="threePt" dir="t"/>
+    </dgm:scene3d>
+    <dgm:sp3d/>
+    <dgm:txPr/>
+    <dgm:style>
+      <a:lnRef idx="2">
+        <a:scrgbClr r="0" g="0" b="0"/>
+      </a:lnRef>
+      <a:fillRef idx="1">
+        <a:scrgbClr r="0" g="0" b="0"/>
+      </a:fillRef>
+      <a:effectRef idx="0">
+        <a:scrgbClr r="0" g="0" b="0"/>
+      </a:effectRef>
+      <a:fontRef idx="minor"/>
+    </dgm:style>
+  </dgm:styleLbl>
+  <dgm:styleLbl name="solidFgAcc1">
+    <dgm:scene3d>
+      <a:camera prst="orthographicFront"/>
+      <a:lightRig rig="threePt" dir="t"/>
+    </dgm:scene3d>
+    <dgm:sp3d/>
+    <dgm:txPr/>
+    <dgm:style>
+      <a:lnRef idx="2">
+        <a:scrgbClr r="0" g="0" b="0"/>
+      </a:lnRef>
+      <a:fillRef idx="1">
+        <a:scrgbClr r="0" g="0" b="0"/>
+      </a:fillRef>
+      <a:effectRef idx="0">
+        <a:scrgbClr r="0" g="0" b="0"/>
+      </a:effectRef>
+      <a:fontRef idx="minor"/>
+    </dgm:style>
+  </dgm:styleLbl>
+  <dgm:styleLbl name="solidAlignAcc1">
+    <dgm:scene3d>
+      <a:camera prst="orthographicFront"/>
+      <a:lightRig rig="threePt" dir="t"/>
+    </dgm:scene3d>
+    <dgm:sp3d/>
+    <dgm:txPr/>
+    <dgm:style>
+      <a:lnRef idx="2">
+        <a:scrgbClr r="0" g="0" b="0"/>
+      </a:lnRef>
+      <a:fillRef idx="1">
+        <a:scrgbClr r="0" g="0" b="0"/>
+      </a:fillRef>
+      <a:effectRef idx="0">
+        <a:scrgbClr r="0" g="0" b="0"/>
+      </a:effectRef>
+      <a:fontRef idx="minor"/>
+    </dgm:style>
+  </dgm:styleLbl>
+  <dgm:styleLbl name="solidBgAcc1">
+    <dgm:scene3d>
+      <a:camera prst="orthographicFront"/>
+      <a:lightRig rig="threePt" dir="t"/>
+    </dgm:scene3d>
+    <dgm:sp3d/>
+    <dgm:txPr/>
+    <dgm:style>
+      <a:lnRef idx="2">
+        <a:scrgbClr r="0" g="0" b="0"/>
+      </a:lnRef>
+      <a:fillRef idx="1">
+        <a:scrgbClr r="0" g="0" b="0"/>
+      </a:fillRef>
+      <a:effectRef idx="0">
+        <a:scrgbClr r="0" g="0" b="0"/>
+      </a:effectRef>
+      <a:fontRef idx="minor"/>
+    </dgm:style>
+  </dgm:styleLbl>
+  <dgm:styleLbl name="fgAccFollowNode1">
+    <dgm:scene3d>
+      <a:camera prst="orthographicFront"/>
+      <a:lightRig rig="threePt" dir="t"/>
+    </dgm:scene3d>
+    <dgm:sp3d/>
+    <dgm:txPr/>
+    <dgm:style>
+      <a:lnRef idx="2">
+        <a:scrgbClr r="0" g="0" b="0"/>
+      </a:lnRef>
+      <a:fillRef idx="1">
+        <a:scrgbClr r="0" g="0" b="0"/>
+      </a:fillRef>
+      <a:effectRef idx="0">
+        <a:scrgbClr r="0" g="0" b="0"/>
+      </a:effectRef>
+      <a:fontRef idx="minor"/>
+    </dgm:style>
+  </dgm:styleLbl>
+  <dgm:styleLbl name="alignAccFollowNode1">
+    <dgm:scene3d>
+      <a:camera prst="orthographicFront"/>
+      <a:lightRig rig="threePt" dir="t"/>
+    </dgm:scene3d>
+    <dgm:sp3d/>
+    <dgm:txPr/>
+    <dgm:style>
+      <a:lnRef idx="2">
+        <a:scrgbClr r="0" g="0" b="0"/>
+      </a:lnRef>
+      <a:fillRef idx="1">
+        <a:scrgbClr r="0" g="0" b="0"/>
+      </a:fillRef>
+      <a:effectRef idx="0">
+        <a:scrgbClr r="0" g="0" b="0"/>
+      </a:effectRef>
+      <a:fontRef idx="minor"/>
+    </dgm:style>
+  </dgm:styleLbl>
+  <dgm:styleLbl name="bgAccFollowNode1">
+    <dgm:scene3d>
+      <a:camera prst="orthographicFront"/>
+      <a:lightRig rig="threePt" dir="t"/>
+    </dgm:scene3d>
+    <dgm:sp3d/>
+    <dgm:txPr/>
+    <dgm:style>
+      <a:lnRef idx="2">
+        <a:scrgbClr r="0" g="0" b="0"/>
+      </a:lnRef>
+      <a:fillRef idx="1">
+        <a:scrgbClr r="0" g="0" b="0"/>
+      </a:fillRef>
+      <a:effectRef idx="0">
+        <a:scrgbClr r="0" g="0" b="0"/>
+      </a:effectRef>
+      <a:fontRef idx="minor"/>
+    </dgm:style>
+  </dgm:styleLbl>
+  <dgm:styleLbl name="fgAcc0">
+    <dgm:scene3d>
+      <a:camera prst="orthographicFront"/>
+      <a:lightRig rig="threePt" dir="t"/>
+    </dgm:scene3d>
+    <dgm:sp3d/>
+    <dgm:txPr/>
+    <dgm:style>
+      <a:lnRef idx="2">
+        <a:scrgbClr r="0" g="0" b="0"/>
+      </a:lnRef>
+      <a:fillRef idx="1">
+        <a:scrgbClr r="0" g="0" b="0"/>
+      </a:fillRef>
+      <a:effectRef idx="0">
+        <a:scrgbClr r="0" g="0" b="0"/>
+      </a:effectRef>
+      <a:fontRef idx="minor"/>
+    </dgm:style>
+  </dgm:styleLbl>
+  <dgm:styleLbl name="fgAcc2">
+    <dgm:scene3d>
+      <a:camera prst="orthographicFront"/>
+      <a:lightRig rig="threePt" dir="t"/>
+    </dgm:scene3d>
+    <dgm:sp3d/>
+    <dgm:txPr/>
+    <dgm:style>
+      <a:lnRef idx="2">
+        <a:scrgbClr r="0" g="0" b="0"/>
+      </a:lnRef>
+      <a:fillRef idx="1">
+        <a:scrgbClr r="0" g="0" b="0"/>
+      </a:fillRef>
+      <a:effectRef idx="0">
+        <a:scrgbClr r="0" g="0" b="0"/>
+      </a:effectRef>
+      <a:fontRef idx="minor"/>
+    </dgm:style>
+  </dgm:styleLbl>
+  <dgm:styleLbl name="fgAcc3">
+    <dgm:scene3d>
+      <a:camera prst="orthographicFront"/>
+      <a:lightRig rig="threePt" dir="t"/>
+    </dgm:scene3d>
+    <dgm:sp3d/>
+    <dgm:txPr/>
+    <dgm:style>
+      <a:lnRef idx="2">
+        <a:scrgbClr r="0" g="0" b="0"/>
+      </a:lnRef>
+      <a:fillRef idx="1">
+        <a:scrgbClr r="0" g="0" b="0"/>
+      </a:fillRef>
+      <a:effectRef idx="0">
+        <a:scrgbClr r="0" g="0" b="0"/>
+      </a:effectRef>
+      <a:fontRef idx="minor"/>
+    </dgm:style>
+  </dgm:styleLbl>
+  <dgm:styleLbl name="fgAcc4">
+    <dgm:scene3d>
+      <a:camera prst="orthographicFront"/>
+      <a:lightRig rig="threePt" dir="t"/>
+    </dgm:scene3d>
+    <dgm:sp3d/>
+    <dgm:txPr/>
+    <dgm:style>
+      <a:lnRef idx="2">
+        <a:scrgbClr r="0" g="0" b="0"/>
+      </a:lnRef>
+      <a:fillRef idx="1">
+        <a:scrgbClr r="0" g="0" b="0"/>
+      </a:fillRef>
+      <a:effectRef idx="0">
+        <a:scrgbClr r="0" g="0" b="0"/>
+      </a:effectRef>
+      <a:fontRef idx="minor"/>
+    </dgm:style>
+  </dgm:styleLbl>
+  <dgm:styleLbl name="bgShp">
+    <dgm:scene3d>
+      <a:camera prst="orthographicFront"/>
+      <a:lightRig rig="threePt" dir="t"/>
+    </dgm:scene3d>
+    <dgm:sp3d/>
+    <dgm:txPr/>
+    <dgm:style>
+      <a:lnRef idx="0">
+        <a:scrgbClr r="0" g="0" b="0"/>
+      </a:lnRef>
+      <a:fillRef idx="1">
+        <a:scrgbClr r="0" g="0" b="0"/>
+      </a:fillRef>
+      <a:effectRef idx="0">
+        <a:scrgbClr r="0" g="0" b="0"/>
+      </a:effectRef>
+      <a:fontRef idx="minor"/>
+    </dgm:style>
+  </dgm:styleLbl>
+  <dgm:styleLbl name="dkBgShp">
+    <dgm:scene3d>
+      <a:camera prst="orthographicFront"/>
+      <a:lightRig rig="threePt" dir="t"/>
+    </dgm:scene3d>
+    <dgm:sp3d/>
+    <dgm:txPr/>
+    <dgm:style>
+      <a:lnRef idx="0">
+        <a:scrgbClr r="0" g="0" b="0"/>
+      </a:lnRef>
+      <a:fillRef idx="1">
+        <a:scrgbClr r="0" g="0" b="0"/>
+      </a:fillRef>
+      <a:effectRef idx="0">
+        <a:scrgbClr r="0" g="0" b="0"/>
+      </a:effectRef>
+      <a:fontRef idx="minor"/>
+    </dgm:style>
+  </dgm:styleLbl>
+  <dgm:styleLbl name="trBgShp">
+    <dgm:scene3d>
+      <a:camera prst="orthographicFront"/>
+      <a:lightRig rig="threePt" dir="t"/>
+    </dgm:scene3d>
+    <dgm:sp3d/>
+    <dgm:txPr/>
+    <dgm:style>
+      <a:lnRef idx="0">
+        <a:scrgbClr r="0" g="0" b="0"/>
+      </a:lnRef>
+      <a:fillRef idx="1">
+        <a:scrgbClr r="0" g="0" b="0"/>
+      </a:fillRef>
+      <a:effectRef idx="0">
+        <a:scrgbClr r="0" g="0" b="0"/>
+      </a:effectRef>
+      <a:fontRef idx="minor"/>
+    </dgm:style>
+  </dgm:styleLbl>
+  <dgm:styleLbl name="fgShp">
+    <dgm:scene3d>
+      <a:camera prst="orthographicFront"/>
+      <a:lightRig rig="threePt" dir="t"/>
+    </dgm:scene3d>
+    <dgm:sp3d/>
+    <dgm:txPr/>
+    <dgm:style>
+      <a:lnRef idx="2">
+        <a:scrgbClr r="0" g="0" b="0"/>
+      </a:lnRef>
+      <a:fillRef idx="1">
+        <a:scrgbClr r="0" g="0" b="0"/>
+      </a:fillRef>
+      <a:effectRef idx="0">
+        <a:scrgbClr r="0" g="0" b="0"/>
+      </a:effectRef>
+      <a:fontRef idx="minor"/>
+    </dgm:style>
+  </dgm:styleLbl>
+  <dgm:styleLbl name="revTx">
+    <dgm:scene3d>
+      <a:camera prst="orthographicFront"/>
+      <a:lightRig rig="threePt" dir="t"/>
+    </dgm:scene3d>
+    <dgm:sp3d/>
+    <dgm:txPr/>
+    <dgm:style>
+      <a:lnRef idx="0">
+        <a:scrgbClr r="0" g="0" b="0"/>
+      </a:lnRef>
+      <a:fillRef idx="0">
+        <a:scrgbClr r="0" g="0" b="0"/>
+      </a:fillRef>
+      <a:effectRef idx="0">
+        <a:scrgbClr r="0" g="0" b="0"/>
+      </a:effectRef>
+      <a:fontRef idx="minor"/>
+    </dgm:style>
+  </dgm:styleLbl>
+</dgm:styleDef>
+</file>
+
+<file path=ppt/diagrams/quickStyle4.xml><?xml version="1.0" encoding="utf-8"?>
 <dgm:styleDef xmlns:dgm="http://schemas.openxmlformats.org/drawingml/2006/diagram" xmlns:a="http://schemas.openxmlformats.org/drawingml/2006/main" uniqueId="urn:microsoft.com/office/officeart/2005/8/quickstyle/simple4">
   <dgm:title val=""/>
   <dgm:desc val=""/>
@@ -10091,7 +12946,7 @@
 </dgm:styleDef>
 </file>
 
-<file path=ppt/diagrams/quickStyle4.xml><?xml version="1.0" encoding="utf-8"?>
+<file path=ppt/diagrams/quickStyle5.xml><?xml version="1.0" encoding="utf-8"?>
 <dgm:styleDef xmlns:dgm="http://schemas.openxmlformats.org/drawingml/2006/diagram" xmlns:a="http://schemas.openxmlformats.org/drawingml/2006/main" uniqueId="urn:microsoft.com/office/officeart/2005/8/quickstyle/simple1">
   <dgm:title val=""/>
   <dgm:desc val=""/>
@@ -11207,7 +14062,7 @@
           <a:p>
             <a:fld id="{F5E18AE9-5501-4B51-80EE-CE9B28B0DB46}" type="datetimeFigureOut">
               <a:rPr lang="en-AU" smtClean="0"/>
-              <a:t>29/08/2024</a:t>
+              <a:t>30/08/2024</a:t>
             </a:fld>
             <a:endParaRPr lang="en-AU"/>
           </a:p>
@@ -11708,7 +14563,7 @@
           <a:p>
             <a:fld id="{5F6A9250-DA9A-4425-AAB4-7D2A3347409A}" type="datetimeFigureOut">
               <a:rPr lang="en-AU" smtClean="0"/>
-              <a:t>29/08/2024</a:t>
+              <a:t>30/08/2024</a:t>
             </a:fld>
             <a:endParaRPr lang="en-AU"/>
           </a:p>
@@ -11908,7 +14763,7 @@
           <a:p>
             <a:fld id="{5F6A9250-DA9A-4425-AAB4-7D2A3347409A}" type="datetimeFigureOut">
               <a:rPr lang="en-AU" smtClean="0"/>
-              <a:t>29/08/2024</a:t>
+              <a:t>30/08/2024</a:t>
             </a:fld>
             <a:endParaRPr lang="en-AU"/>
           </a:p>
@@ -12118,7 +14973,7 @@
           <a:p>
             <a:fld id="{5F6A9250-DA9A-4425-AAB4-7D2A3347409A}" type="datetimeFigureOut">
               <a:rPr lang="en-AU" smtClean="0"/>
-              <a:t>29/08/2024</a:t>
+              <a:t>30/08/2024</a:t>
             </a:fld>
             <a:endParaRPr lang="en-AU"/>
           </a:p>
@@ -12318,7 +15173,7 @@
           <a:p>
             <a:fld id="{5F6A9250-DA9A-4425-AAB4-7D2A3347409A}" type="datetimeFigureOut">
               <a:rPr lang="en-AU" smtClean="0"/>
-              <a:t>29/08/2024</a:t>
+              <a:t>30/08/2024</a:t>
             </a:fld>
             <a:endParaRPr lang="en-AU"/>
           </a:p>
@@ -12594,7 +15449,7 @@
           <a:p>
             <a:fld id="{5F6A9250-DA9A-4425-AAB4-7D2A3347409A}" type="datetimeFigureOut">
               <a:rPr lang="en-AU" smtClean="0"/>
-              <a:t>29/08/2024</a:t>
+              <a:t>30/08/2024</a:t>
             </a:fld>
             <a:endParaRPr lang="en-AU"/>
           </a:p>
@@ -12862,7 +15717,7 @@
           <a:p>
             <a:fld id="{5F6A9250-DA9A-4425-AAB4-7D2A3347409A}" type="datetimeFigureOut">
               <a:rPr lang="en-AU" smtClean="0"/>
-              <a:t>29/08/2024</a:t>
+              <a:t>30/08/2024</a:t>
             </a:fld>
             <a:endParaRPr lang="en-AU"/>
           </a:p>
@@ -13277,7 +16132,7 @@
           <a:p>
             <a:fld id="{5F6A9250-DA9A-4425-AAB4-7D2A3347409A}" type="datetimeFigureOut">
               <a:rPr lang="en-AU" smtClean="0"/>
-              <a:t>29/08/2024</a:t>
+              <a:t>30/08/2024</a:t>
             </a:fld>
             <a:endParaRPr lang="en-AU"/>
           </a:p>
@@ -13419,7 +16274,7 @@
           <a:p>
             <a:fld id="{5F6A9250-DA9A-4425-AAB4-7D2A3347409A}" type="datetimeFigureOut">
               <a:rPr lang="en-AU" smtClean="0"/>
-              <a:t>29/08/2024</a:t>
+              <a:t>30/08/2024</a:t>
             </a:fld>
             <a:endParaRPr lang="en-AU"/>
           </a:p>
@@ -13532,7 +16387,7 @@
           <a:p>
             <a:fld id="{5F6A9250-DA9A-4425-AAB4-7D2A3347409A}" type="datetimeFigureOut">
               <a:rPr lang="en-AU" smtClean="0"/>
-              <a:t>29/08/2024</a:t>
+              <a:t>30/08/2024</a:t>
             </a:fld>
             <a:endParaRPr lang="en-AU"/>
           </a:p>
@@ -13845,7 +16700,7 @@
           <a:p>
             <a:fld id="{5F6A9250-DA9A-4425-AAB4-7D2A3347409A}" type="datetimeFigureOut">
               <a:rPr lang="en-AU" smtClean="0"/>
-              <a:t>29/08/2024</a:t>
+              <a:t>30/08/2024</a:t>
             </a:fld>
             <a:endParaRPr lang="en-AU"/>
           </a:p>
@@ -14134,7 +16989,7 @@
           <a:p>
             <a:fld id="{5F6A9250-DA9A-4425-AAB4-7D2A3347409A}" type="datetimeFigureOut">
               <a:rPr lang="en-AU" smtClean="0"/>
-              <a:t>29/08/2024</a:t>
+              <a:t>30/08/2024</a:t>
             </a:fld>
             <a:endParaRPr lang="en-AU"/>
           </a:p>
@@ -14377,7 +17232,7 @@
           <a:p>
             <a:fld id="{5F6A9250-DA9A-4425-AAB4-7D2A3347409A}" type="datetimeFigureOut">
               <a:rPr lang="en-AU" smtClean="0"/>
-              <a:t>29/08/2024</a:t>
+              <a:t>30/08/2024</a:t>
             </a:fld>
             <a:endParaRPr lang="en-AU"/>
           </a:p>
@@ -17615,7 +20470,7 @@
             <p:ph idx="1"/>
             <p:extLst>
               <p:ext uri="{D42A27DB-BD31-4B8C-83A1-F6EECF244321}">
-                <p14:modId xmlns:p14="http://schemas.microsoft.com/office/powerpoint/2010/main" val="4143585643"/>
+                <p14:modId xmlns:p14="http://schemas.microsoft.com/office/powerpoint/2010/main" val="1539266297"/>
               </p:ext>
             </p:extLst>
           </p:nvPr>
@@ -18911,7 +21766,7 @@
         </p:nvSpPr>
         <p:spPr>
           <a:xfrm>
-            <a:off x="438913" y="859536"/>
+            <a:off x="438912" y="125624"/>
             <a:ext cx="4832802" cy="1170432"/>
           </a:xfrm>
         </p:spPr>
@@ -18925,7 +21780,7 @@
               <a:rPr lang="en-US" sz="3400"/>
               <a:t>Datasets </a:t>
             </a:r>
-            <a:endParaRPr lang="en-AU" sz="3400"/>
+            <a:endParaRPr lang="en-AU" sz="3400" dirty="0"/>
           </a:p>
         </p:txBody>
       </p:sp>
@@ -19090,65 +21945,32 @@
           </a:p>
         </p:txBody>
       </p:sp>
-      <p:sp>
-        <p:nvSpPr>
-          <p:cNvPr id="3" name="Content Placeholder 2">
+      <p:graphicFrame>
+        <p:nvGraphicFramePr>
+          <p:cNvPr id="22" name="Content Placeholder 2">
             <a:extLst>
               <a:ext uri="{FF2B5EF4-FFF2-40B4-BE49-F238E27FC236}">
-                <a16:creationId xmlns:a16="http://schemas.microsoft.com/office/drawing/2014/main" id="{7A5907AC-035A-C312-E75F-734DBFBF991F}"/>
+                <a16:creationId xmlns:a16="http://schemas.microsoft.com/office/drawing/2014/main" id="{D7E11E63-FDCE-51D9-3F7F-46A5DE15C57E}"/>
               </a:ext>
             </a:extLst>
           </p:cNvPr>
-          <p:cNvSpPr>
-            <a:spLocks noGrp="1"/>
-          </p:cNvSpPr>
+          <p:cNvGraphicFramePr>
+            <a:graphicFrameLocks noGrp="1"/>
+          </p:cNvGraphicFramePr>
           <p:nvPr>
             <p:ph idx="1"/>
           </p:nvPr>
-        </p:nvSpPr>
-        <p:spPr>
-          <a:xfrm>
-            <a:off x="438912" y="2512611"/>
-            <a:ext cx="4832803" cy="3664351"/>
-          </a:xfrm>
-        </p:spPr>
-        <p:txBody>
-          <a:bodyPr>
-            <a:normAutofit/>
-          </a:bodyPr>
-          <a:lstStyle/>
-          <a:p>
-            <a:r>
-              <a:rPr lang="en-US" sz="1800"/>
-              <a:t>Task 1 Output </a:t>
-            </a:r>
-          </a:p>
-          <a:p>
-            <a:endParaRPr lang="en-US" sz="1800"/>
-          </a:p>
-          <a:p>
-            <a:endParaRPr lang="en-US" sz="1800"/>
-          </a:p>
-          <a:p>
-            <a:endParaRPr lang="en-US" sz="1800"/>
-          </a:p>
-          <a:p>
-            <a:endParaRPr lang="en-US" sz="1800"/>
-          </a:p>
-          <a:p>
-            <a:r>
-              <a:rPr lang="en-US" sz="1800"/>
-              <a:t>Auxiliary Metadata</a:t>
-            </a:r>
-          </a:p>
-          <a:p>
-            <a:pPr marL="0" indent="0">
-              <a:buNone/>
-            </a:pPr>
-            <a:endParaRPr lang="en-AU" sz="1800"/>
-          </a:p>
-        </p:txBody>
-      </p:sp>
+        </p:nvGraphicFramePr>
+        <p:xfrm>
+          <a:off x="438912" y="1483562"/>
+          <a:ext cx="4832803" cy="3664351"/>
+        </p:xfrm>
+        <a:graphic>
+          <a:graphicData uri="http://schemas.openxmlformats.org/drawingml/2006/diagram">
+            <dgm:relIds xmlns:dgm="http://schemas.openxmlformats.org/drawingml/2006/diagram" xmlns:r="http://schemas.openxmlformats.org/officeDocument/2006/relationships" r:dm="rId2" r:lo="rId3" r:qs="rId4" r:cs="rId5"/>
+          </a:graphicData>
+        </a:graphic>
+      </p:graphicFrame>
       <p:pic>
         <p:nvPicPr>
           <p:cNvPr id="7" name="Picture 6">
@@ -19164,15 +21986,15 @@
           <p:nvPr/>
         </p:nvPicPr>
         <p:blipFill>
-          <a:blip r:embed="rId2"/>
+          <a:blip r:embed="rId7"/>
           <a:stretch>
             <a:fillRect/>
           </a:stretch>
         </p:blipFill>
         <p:spPr>
           <a:xfrm>
-            <a:off x="4250478" y="4193819"/>
-            <a:ext cx="5500011" cy="2420004"/>
+            <a:off x="5514391" y="2667877"/>
+            <a:ext cx="5303027" cy="2333331"/>
           </a:xfrm>
           <a:prstGeom prst="rect">
             <a:avLst/>
@@ -19194,15 +22016,15 @@
           <p:nvPr/>
         </p:nvPicPr>
         <p:blipFill>
-          <a:blip r:embed="rId3"/>
+          <a:blip r:embed="rId8"/>
           <a:stretch>
             <a:fillRect/>
           </a:stretch>
         </p:blipFill>
         <p:spPr>
           <a:xfrm>
-            <a:off x="4250479" y="2215219"/>
-            <a:ext cx="7502609" cy="1575548"/>
+            <a:off x="5514392" y="1313814"/>
+            <a:ext cx="6447919" cy="1354063"/>
           </a:xfrm>
           <a:prstGeom prst="rect">
             <a:avLst/>

</xml_diff>